<commit_message>
John updated workflow schematic
</commit_message>
<xml_diff>
--- a/workflow.pptx
+++ b/workflow.pptx
@@ -2,18 +2,18 @@
 <file path=ppt/presentation.xml><?xml version="1.0" encoding="utf-8"?>
 <p:presentation xmlns:a="http://schemas.openxmlformats.org/drawingml/2006/main" xmlns:r="http://schemas.openxmlformats.org/officeDocument/2006/relationships" xmlns:p="http://schemas.openxmlformats.org/presentationml/2006/main" saveSubsetFonts="1">
   <p:sldMasterIdLst>
-    <p:sldMasterId id="2147483648" r:id="rId1"/>
+    <p:sldMasterId id="2147483660" r:id="rId1"/>
   </p:sldMasterIdLst>
   <p:sldIdLst>
     <p:sldId id="256" r:id="rId2"/>
   </p:sldIdLst>
-  <p:sldSz cx="12192000" cy="6858000"/>
+  <p:sldSz cx="13536613" cy="6858000"/>
   <p:notesSz cx="6858000" cy="9144000"/>
   <p:defaultTextStyle>
     <a:defPPr>
       <a:defRPr lang="en-US"/>
     </a:defPPr>
-    <a:lvl1pPr marL="0" algn="l" defTabSz="914400" rtl="0" eaLnBrk="1" latinLnBrk="0" hangingPunct="1">
+    <a:lvl1pPr marL="0" algn="l" defTabSz="457200" rtl="0" eaLnBrk="1" latinLnBrk="0" hangingPunct="1">
       <a:defRPr sz="1800" kern="1200">
         <a:solidFill>
           <a:schemeClr val="tx1"/>
@@ -23,7 +23,7 @@
         <a:cs typeface="+mn-cs"/>
       </a:defRPr>
     </a:lvl1pPr>
-    <a:lvl2pPr marL="457200" algn="l" defTabSz="914400" rtl="0" eaLnBrk="1" latinLnBrk="0" hangingPunct="1">
+    <a:lvl2pPr marL="457200" algn="l" defTabSz="457200" rtl="0" eaLnBrk="1" latinLnBrk="0" hangingPunct="1">
       <a:defRPr sz="1800" kern="1200">
         <a:solidFill>
           <a:schemeClr val="tx1"/>
@@ -33,7 +33,7 @@
         <a:cs typeface="+mn-cs"/>
       </a:defRPr>
     </a:lvl2pPr>
-    <a:lvl3pPr marL="914400" algn="l" defTabSz="914400" rtl="0" eaLnBrk="1" latinLnBrk="0" hangingPunct="1">
+    <a:lvl3pPr marL="914400" algn="l" defTabSz="457200" rtl="0" eaLnBrk="1" latinLnBrk="0" hangingPunct="1">
       <a:defRPr sz="1800" kern="1200">
         <a:solidFill>
           <a:schemeClr val="tx1"/>
@@ -43,7 +43,7 @@
         <a:cs typeface="+mn-cs"/>
       </a:defRPr>
     </a:lvl3pPr>
-    <a:lvl4pPr marL="1371600" algn="l" defTabSz="914400" rtl="0" eaLnBrk="1" latinLnBrk="0" hangingPunct="1">
+    <a:lvl4pPr marL="1371600" algn="l" defTabSz="457200" rtl="0" eaLnBrk="1" latinLnBrk="0" hangingPunct="1">
       <a:defRPr sz="1800" kern="1200">
         <a:solidFill>
           <a:schemeClr val="tx1"/>
@@ -53,7 +53,7 @@
         <a:cs typeface="+mn-cs"/>
       </a:defRPr>
     </a:lvl4pPr>
-    <a:lvl5pPr marL="1828800" algn="l" defTabSz="914400" rtl="0" eaLnBrk="1" latinLnBrk="0" hangingPunct="1">
+    <a:lvl5pPr marL="1828800" algn="l" defTabSz="457200" rtl="0" eaLnBrk="1" latinLnBrk="0" hangingPunct="1">
       <a:defRPr sz="1800" kern="1200">
         <a:solidFill>
           <a:schemeClr val="tx1"/>
@@ -63,7 +63,7 @@
         <a:cs typeface="+mn-cs"/>
       </a:defRPr>
     </a:lvl5pPr>
-    <a:lvl6pPr marL="2286000" algn="l" defTabSz="914400" rtl="0" eaLnBrk="1" latinLnBrk="0" hangingPunct="1">
+    <a:lvl6pPr marL="2286000" algn="l" defTabSz="457200" rtl="0" eaLnBrk="1" latinLnBrk="0" hangingPunct="1">
       <a:defRPr sz="1800" kern="1200">
         <a:solidFill>
           <a:schemeClr val="tx1"/>
@@ -73,7 +73,7 @@
         <a:cs typeface="+mn-cs"/>
       </a:defRPr>
     </a:lvl6pPr>
-    <a:lvl7pPr marL="2743200" algn="l" defTabSz="914400" rtl="0" eaLnBrk="1" latinLnBrk="0" hangingPunct="1">
+    <a:lvl7pPr marL="2743200" algn="l" defTabSz="457200" rtl="0" eaLnBrk="1" latinLnBrk="0" hangingPunct="1">
       <a:defRPr sz="1800" kern="1200">
         <a:solidFill>
           <a:schemeClr val="tx1"/>
@@ -83,7 +83,7 @@
         <a:cs typeface="+mn-cs"/>
       </a:defRPr>
     </a:lvl7pPr>
-    <a:lvl8pPr marL="3200400" algn="l" defTabSz="914400" rtl="0" eaLnBrk="1" latinLnBrk="0" hangingPunct="1">
+    <a:lvl8pPr marL="3200400" algn="l" defTabSz="457200" rtl="0" eaLnBrk="1" latinLnBrk="0" hangingPunct="1">
       <a:defRPr sz="1800" kern="1200">
         <a:solidFill>
           <a:schemeClr val="tx1"/>
@@ -93,7 +93,7 @@
         <a:cs typeface="+mn-cs"/>
       </a:defRPr>
     </a:lvl8pPr>
-    <a:lvl9pPr marL="3657600" algn="l" defTabSz="914400" rtl="0" eaLnBrk="1" latinLnBrk="0" hangingPunct="1">
+    <a:lvl9pPr marL="3657600" algn="l" defTabSz="457200" rtl="0" eaLnBrk="1" latinLnBrk="0" hangingPunct="1">
       <a:defRPr sz="1800" kern="1200">
         <a:solidFill>
           <a:schemeClr val="tx1"/>
@@ -104,6 +104,11 @@
       </a:defRPr>
     </a:lvl9pPr>
   </p:defaultTextStyle>
+  <p:extLst>
+    <p:ext uri="{EFAFB233-063F-42B5-8137-9DF3F51BA10A}">
+      <p15:sldGuideLst xmlns:p15="http://schemas.microsoft.com/office/powerpoint/2012/main"/>
+    </p:ext>
+  </p:extLst>
 </p:presentation>
 </file>
 
@@ -117,20 +122,6 @@
     </p:extLst>
   </p:cmAuthor>
 </p:cmAuthorLst>
-</file>
-
-<file path=ppt/comments/comment1.xml><?xml version="1.0" encoding="utf-8"?>
-<p:cmLst xmlns:a="http://schemas.openxmlformats.org/drawingml/2006/main" xmlns:r="http://schemas.openxmlformats.org/officeDocument/2006/relationships" xmlns:p="http://schemas.openxmlformats.org/presentationml/2006/main">
-  <p:cm authorId="1" dt="2017-03-23T18:33:56.239" idx="1">
-    <p:pos x="4370" y="1432"/>
-    <p:text>These can be replaced with hexagon symbols taking folk to our tutorials</p:text>
-    <p:extLst>
-      <p:ext uri="{C676402C-5697-4E1C-873F-D02D1690AC5C}">
-        <p15:threadingInfo xmlns:p15="http://schemas.microsoft.com/office/powerpoint/2012/main" timeZoneBias="0"/>
-      </p:ext>
-    </p:extLst>
-  </p:cm>
-</p:cmLst>
 </file>
 
 <file path=ppt/slideLayouts/slideLayout1.xml><?xml version="1.0" encoding="utf-8"?>
@@ -162,8 +153,8 @@
         </p:nvSpPr>
         <p:spPr>
           <a:xfrm>
-            <a:off x="1524000" y="1122363"/>
-            <a:ext cx="9144000" cy="2387600"/>
+            <a:off x="1692077" y="1122363"/>
+            <a:ext cx="10152460" cy="2387600"/>
           </a:xfrm>
         </p:spPr>
         <p:txBody>
@@ -178,7 +169,7 @@
               <a:rPr lang="en-US" smtClean="0"/>
               <a:t>Click to edit Master title style</a:t>
             </a:r>
-            <a:endParaRPr lang="en-GB"/>
+            <a:endParaRPr lang="en-US" dirty="0"/>
           </a:p>
         </p:txBody>
       </p:sp>
@@ -194,8 +185,8 @@
         </p:nvSpPr>
         <p:spPr>
           <a:xfrm>
-            <a:off x="1524000" y="3602038"/>
-            <a:ext cx="9144000" cy="1655762"/>
+            <a:off x="1692077" y="3602038"/>
+            <a:ext cx="10152460" cy="1655762"/>
           </a:xfrm>
         </p:spPr>
         <p:txBody>
@@ -243,7 +234,7 @@
               <a:rPr lang="en-US" smtClean="0"/>
               <a:t>Click to edit Master subtitle style</a:t>
             </a:r>
-            <a:endParaRPr lang="en-GB"/>
+            <a:endParaRPr lang="en-US" dirty="0"/>
           </a:p>
         </p:txBody>
       </p:sp>
@@ -264,7 +255,7 @@
           <a:p>
             <a:fld id="{6CABAE2C-A9B2-44D4-9841-AA83B93BFA75}" type="datetimeFigureOut">
               <a:rPr lang="en-GB" smtClean="0"/>
-              <a:t>23/03/2017</a:t>
+              <a:t>24/03/2017</a:t>
             </a:fld>
             <a:endParaRPr lang="en-GB"/>
           </a:p>
@@ -315,7 +306,7 @@
     </p:spTree>
     <p:extLst>
       <p:ext uri="{BB962C8B-B14F-4D97-AF65-F5344CB8AC3E}">
-        <p14:creationId xmlns:p14="http://schemas.microsoft.com/office/powerpoint/2010/main" val="2046454350"/>
+        <p14:creationId xmlns:p14="http://schemas.microsoft.com/office/powerpoint/2010/main" val="2462892800"/>
       </p:ext>
     </p:extLst>
   </p:cSld>
@@ -361,7 +352,7 @@
               <a:rPr lang="en-US" smtClean="0"/>
               <a:t>Click to edit Master title style</a:t>
             </a:r>
-            <a:endParaRPr lang="en-GB"/>
+            <a:endParaRPr lang="en-US" dirty="0"/>
           </a:p>
         </p:txBody>
       </p:sp>
@@ -413,7 +404,7 @@
               <a:rPr lang="en-US" smtClean="0"/>
               <a:t>Fifth level</a:t>
             </a:r>
-            <a:endParaRPr lang="en-GB"/>
+            <a:endParaRPr lang="en-US" dirty="0"/>
           </a:p>
         </p:txBody>
       </p:sp>
@@ -434,7 +425,7 @@
           <a:p>
             <a:fld id="{6CABAE2C-A9B2-44D4-9841-AA83B93BFA75}" type="datetimeFigureOut">
               <a:rPr lang="en-GB" smtClean="0"/>
-              <a:t>23/03/2017</a:t>
+              <a:t>24/03/2017</a:t>
             </a:fld>
             <a:endParaRPr lang="en-GB"/>
           </a:p>
@@ -485,7 +476,7 @@
     </p:spTree>
     <p:extLst>
       <p:ext uri="{BB962C8B-B14F-4D97-AF65-F5344CB8AC3E}">
-        <p14:creationId xmlns:p14="http://schemas.microsoft.com/office/powerpoint/2010/main" val="2469502945"/>
+        <p14:creationId xmlns:p14="http://schemas.microsoft.com/office/powerpoint/2010/main" val="3810396093"/>
       </p:ext>
     </p:extLst>
   </p:cSld>
@@ -524,8 +515,8 @@
         </p:nvSpPr>
         <p:spPr>
           <a:xfrm>
-            <a:off x="8724900" y="365125"/>
-            <a:ext cx="2628900" cy="5811838"/>
+            <a:off x="9687139" y="365125"/>
+            <a:ext cx="2918832" cy="5811838"/>
           </a:xfrm>
         </p:spPr>
         <p:txBody>
@@ -536,7 +527,7 @@
               <a:rPr lang="en-US" smtClean="0"/>
               <a:t>Click to edit Master title style</a:t>
             </a:r>
-            <a:endParaRPr lang="en-GB"/>
+            <a:endParaRPr lang="en-US" dirty="0"/>
           </a:p>
         </p:txBody>
       </p:sp>
@@ -552,8 +543,8 @@
         </p:nvSpPr>
         <p:spPr>
           <a:xfrm>
-            <a:off x="838200" y="365125"/>
-            <a:ext cx="7734300" cy="5811838"/>
+            <a:off x="930642" y="365125"/>
+            <a:ext cx="8587289" cy="5811838"/>
           </a:xfrm>
         </p:spPr>
         <p:txBody>
@@ -593,7 +584,7 @@
               <a:rPr lang="en-US" smtClean="0"/>
               <a:t>Fifth level</a:t>
             </a:r>
-            <a:endParaRPr lang="en-GB"/>
+            <a:endParaRPr lang="en-US" dirty="0"/>
           </a:p>
         </p:txBody>
       </p:sp>
@@ -614,7 +605,7 @@
           <a:p>
             <a:fld id="{6CABAE2C-A9B2-44D4-9841-AA83B93BFA75}" type="datetimeFigureOut">
               <a:rPr lang="en-GB" smtClean="0"/>
-              <a:t>23/03/2017</a:t>
+              <a:t>24/03/2017</a:t>
             </a:fld>
             <a:endParaRPr lang="en-GB"/>
           </a:p>
@@ -665,7 +656,7 @@
     </p:spTree>
     <p:extLst>
       <p:ext uri="{BB962C8B-B14F-4D97-AF65-F5344CB8AC3E}">
-        <p14:creationId xmlns:p14="http://schemas.microsoft.com/office/powerpoint/2010/main" val="504343143"/>
+        <p14:creationId xmlns:p14="http://schemas.microsoft.com/office/powerpoint/2010/main" val="3283769758"/>
       </p:ext>
     </p:extLst>
   </p:cSld>
@@ -711,7 +702,7 @@
               <a:rPr lang="en-US" smtClean="0"/>
               <a:t>Click to edit Master title style</a:t>
             </a:r>
-            <a:endParaRPr lang="en-GB"/>
+            <a:endParaRPr lang="en-US" dirty="0"/>
           </a:p>
         </p:txBody>
       </p:sp>
@@ -763,7 +754,7 @@
               <a:rPr lang="en-US" smtClean="0"/>
               <a:t>Fifth level</a:t>
             </a:r>
-            <a:endParaRPr lang="en-GB"/>
+            <a:endParaRPr lang="en-US" dirty="0"/>
           </a:p>
         </p:txBody>
       </p:sp>
@@ -784,7 +775,7 @@
           <a:p>
             <a:fld id="{6CABAE2C-A9B2-44D4-9841-AA83B93BFA75}" type="datetimeFigureOut">
               <a:rPr lang="en-GB" smtClean="0"/>
-              <a:t>23/03/2017</a:t>
+              <a:t>24/03/2017</a:t>
             </a:fld>
             <a:endParaRPr lang="en-GB"/>
           </a:p>
@@ -835,7 +826,7 @@
     </p:spTree>
     <p:extLst>
       <p:ext uri="{BB962C8B-B14F-4D97-AF65-F5344CB8AC3E}">
-        <p14:creationId xmlns:p14="http://schemas.microsoft.com/office/powerpoint/2010/main" val="2903294157"/>
+        <p14:creationId xmlns:p14="http://schemas.microsoft.com/office/powerpoint/2010/main" val="923735142"/>
       </p:ext>
     </p:extLst>
   </p:cSld>
@@ -874,8 +865,8 @@
         </p:nvSpPr>
         <p:spPr>
           <a:xfrm>
-            <a:off x="831850" y="1709738"/>
-            <a:ext cx="10515600" cy="2852737"/>
+            <a:off x="923592" y="1709739"/>
+            <a:ext cx="11675329" cy="2852737"/>
           </a:xfrm>
         </p:spPr>
         <p:txBody>
@@ -890,7 +881,7 @@
               <a:rPr lang="en-US" smtClean="0"/>
               <a:t>Click to edit Master title style</a:t>
             </a:r>
-            <a:endParaRPr lang="en-GB"/>
+            <a:endParaRPr lang="en-US" dirty="0"/>
           </a:p>
         </p:txBody>
       </p:sp>
@@ -906,8 +897,8 @@
         </p:nvSpPr>
         <p:spPr>
           <a:xfrm>
-            <a:off x="831850" y="4589463"/>
-            <a:ext cx="10515600" cy="1500187"/>
+            <a:off x="923592" y="4589464"/>
+            <a:ext cx="11675329" cy="1500187"/>
           </a:xfrm>
         </p:spPr>
         <p:txBody>
@@ -1030,7 +1021,7 @@
           <a:p>
             <a:fld id="{6CABAE2C-A9B2-44D4-9841-AA83B93BFA75}" type="datetimeFigureOut">
               <a:rPr lang="en-GB" smtClean="0"/>
-              <a:t>23/03/2017</a:t>
+              <a:t>24/03/2017</a:t>
             </a:fld>
             <a:endParaRPr lang="en-GB"/>
           </a:p>
@@ -1081,7 +1072,7 @@
     </p:spTree>
     <p:extLst>
       <p:ext uri="{BB962C8B-B14F-4D97-AF65-F5344CB8AC3E}">
-        <p14:creationId xmlns:p14="http://schemas.microsoft.com/office/powerpoint/2010/main" val="3704066882"/>
+        <p14:creationId xmlns:p14="http://schemas.microsoft.com/office/powerpoint/2010/main" val="1806002251"/>
       </p:ext>
     </p:extLst>
   </p:cSld>
@@ -1127,7 +1118,7 @@
               <a:rPr lang="en-US" smtClean="0"/>
               <a:t>Click to edit Master title style</a:t>
             </a:r>
-            <a:endParaRPr lang="en-GB"/>
+            <a:endParaRPr lang="en-US" dirty="0"/>
           </a:p>
         </p:txBody>
       </p:sp>
@@ -1143,8 +1134,8 @@
         </p:nvSpPr>
         <p:spPr>
           <a:xfrm>
-            <a:off x="838200" y="1825625"/>
-            <a:ext cx="5181600" cy="4351338"/>
+            <a:off x="930642" y="1825625"/>
+            <a:ext cx="5753061" cy="4351338"/>
           </a:xfrm>
         </p:spPr>
         <p:txBody>
@@ -1184,7 +1175,7 @@
               <a:rPr lang="en-US" smtClean="0"/>
               <a:t>Fifth level</a:t>
             </a:r>
-            <a:endParaRPr lang="en-GB"/>
+            <a:endParaRPr lang="en-US" dirty="0"/>
           </a:p>
         </p:txBody>
       </p:sp>
@@ -1200,8 +1191,8 @@
         </p:nvSpPr>
         <p:spPr>
           <a:xfrm>
-            <a:off x="6172200" y="1825625"/>
-            <a:ext cx="5181600" cy="4351338"/>
+            <a:off x="6852910" y="1825625"/>
+            <a:ext cx="5753061" cy="4351338"/>
           </a:xfrm>
         </p:spPr>
         <p:txBody>
@@ -1241,7 +1232,7 @@
               <a:rPr lang="en-US" smtClean="0"/>
               <a:t>Fifth level</a:t>
             </a:r>
-            <a:endParaRPr lang="en-GB"/>
+            <a:endParaRPr lang="en-US" dirty="0"/>
           </a:p>
         </p:txBody>
       </p:sp>
@@ -1262,7 +1253,7 @@
           <a:p>
             <a:fld id="{6CABAE2C-A9B2-44D4-9841-AA83B93BFA75}" type="datetimeFigureOut">
               <a:rPr lang="en-GB" smtClean="0"/>
-              <a:t>23/03/2017</a:t>
+              <a:t>24/03/2017</a:t>
             </a:fld>
             <a:endParaRPr lang="en-GB"/>
           </a:p>
@@ -1313,7 +1304,7 @@
     </p:spTree>
     <p:extLst>
       <p:ext uri="{BB962C8B-B14F-4D97-AF65-F5344CB8AC3E}">
-        <p14:creationId xmlns:p14="http://schemas.microsoft.com/office/powerpoint/2010/main" val="2287264702"/>
+        <p14:creationId xmlns:p14="http://schemas.microsoft.com/office/powerpoint/2010/main" val="305342447"/>
       </p:ext>
     </p:extLst>
   </p:cSld>
@@ -1352,8 +1343,8 @@
         </p:nvSpPr>
         <p:spPr>
           <a:xfrm>
-            <a:off x="839788" y="365125"/>
-            <a:ext cx="10515600" cy="1325563"/>
+            <a:off x="932405" y="365126"/>
+            <a:ext cx="11675329" cy="1325563"/>
           </a:xfrm>
         </p:spPr>
         <p:txBody>
@@ -1364,7 +1355,7 @@
               <a:rPr lang="en-US" smtClean="0"/>
               <a:t>Click to edit Master title style</a:t>
             </a:r>
-            <a:endParaRPr lang="en-GB"/>
+            <a:endParaRPr lang="en-US" dirty="0"/>
           </a:p>
         </p:txBody>
       </p:sp>
@@ -1380,8 +1371,8 @@
         </p:nvSpPr>
         <p:spPr>
           <a:xfrm>
-            <a:off x="839788" y="1681163"/>
-            <a:ext cx="5157787" cy="823912"/>
+            <a:off x="932406" y="1681163"/>
+            <a:ext cx="5726621" cy="823912"/>
           </a:xfrm>
         </p:spPr>
         <p:txBody>
@@ -1445,8 +1436,8 @@
         </p:nvSpPr>
         <p:spPr>
           <a:xfrm>
-            <a:off x="839788" y="2505075"/>
-            <a:ext cx="5157787" cy="3684588"/>
+            <a:off x="932406" y="2505075"/>
+            <a:ext cx="5726621" cy="3684588"/>
           </a:xfrm>
         </p:spPr>
         <p:txBody>
@@ -1486,7 +1477,7 @@
               <a:rPr lang="en-US" smtClean="0"/>
               <a:t>Fifth level</a:t>
             </a:r>
-            <a:endParaRPr lang="en-GB"/>
+            <a:endParaRPr lang="en-US" dirty="0"/>
           </a:p>
         </p:txBody>
       </p:sp>
@@ -1502,8 +1493,8 @@
         </p:nvSpPr>
         <p:spPr>
           <a:xfrm>
-            <a:off x="6172200" y="1681163"/>
-            <a:ext cx="5183188" cy="823912"/>
+            <a:off x="6852910" y="1681163"/>
+            <a:ext cx="5754824" cy="823912"/>
           </a:xfrm>
         </p:spPr>
         <p:txBody>
@@ -1567,8 +1558,8 @@
         </p:nvSpPr>
         <p:spPr>
           <a:xfrm>
-            <a:off x="6172200" y="2505075"/>
-            <a:ext cx="5183188" cy="3684588"/>
+            <a:off x="6852910" y="2505075"/>
+            <a:ext cx="5754824" cy="3684588"/>
           </a:xfrm>
         </p:spPr>
         <p:txBody>
@@ -1608,7 +1599,7 @@
               <a:rPr lang="en-US" smtClean="0"/>
               <a:t>Fifth level</a:t>
             </a:r>
-            <a:endParaRPr lang="en-GB"/>
+            <a:endParaRPr lang="en-US" dirty="0"/>
           </a:p>
         </p:txBody>
       </p:sp>
@@ -1629,7 +1620,7 @@
           <a:p>
             <a:fld id="{6CABAE2C-A9B2-44D4-9841-AA83B93BFA75}" type="datetimeFigureOut">
               <a:rPr lang="en-GB" smtClean="0"/>
-              <a:t>23/03/2017</a:t>
+              <a:t>24/03/2017</a:t>
             </a:fld>
             <a:endParaRPr lang="en-GB"/>
           </a:p>
@@ -1680,7 +1671,7 @@
     </p:spTree>
     <p:extLst>
       <p:ext uri="{BB962C8B-B14F-4D97-AF65-F5344CB8AC3E}">
-        <p14:creationId xmlns:p14="http://schemas.microsoft.com/office/powerpoint/2010/main" val="779793014"/>
+        <p14:creationId xmlns:p14="http://schemas.microsoft.com/office/powerpoint/2010/main" val="4051973062"/>
       </p:ext>
     </p:extLst>
   </p:cSld>
@@ -1726,7 +1717,7 @@
               <a:rPr lang="en-US" smtClean="0"/>
               <a:t>Click to edit Master title style</a:t>
             </a:r>
-            <a:endParaRPr lang="en-GB"/>
+            <a:endParaRPr lang="en-US" dirty="0"/>
           </a:p>
         </p:txBody>
       </p:sp>
@@ -1747,7 +1738,7 @@
           <a:p>
             <a:fld id="{6CABAE2C-A9B2-44D4-9841-AA83B93BFA75}" type="datetimeFigureOut">
               <a:rPr lang="en-GB" smtClean="0"/>
-              <a:t>23/03/2017</a:t>
+              <a:t>24/03/2017</a:t>
             </a:fld>
             <a:endParaRPr lang="en-GB"/>
           </a:p>
@@ -1798,7 +1789,7 @@
     </p:spTree>
     <p:extLst>
       <p:ext uri="{BB962C8B-B14F-4D97-AF65-F5344CB8AC3E}">
-        <p14:creationId xmlns:p14="http://schemas.microsoft.com/office/powerpoint/2010/main" val="4185286349"/>
+        <p14:creationId xmlns:p14="http://schemas.microsoft.com/office/powerpoint/2010/main" val="360551993"/>
       </p:ext>
     </p:extLst>
   </p:cSld>
@@ -1842,7 +1833,7 @@
           <a:p>
             <a:fld id="{6CABAE2C-A9B2-44D4-9841-AA83B93BFA75}" type="datetimeFigureOut">
               <a:rPr lang="en-GB" smtClean="0"/>
-              <a:t>23/03/2017</a:t>
+              <a:t>24/03/2017</a:t>
             </a:fld>
             <a:endParaRPr lang="en-GB"/>
           </a:p>
@@ -1893,7 +1884,7 @@
     </p:spTree>
     <p:extLst>
       <p:ext uri="{BB962C8B-B14F-4D97-AF65-F5344CB8AC3E}">
-        <p14:creationId xmlns:p14="http://schemas.microsoft.com/office/powerpoint/2010/main" val="3830730767"/>
+        <p14:creationId xmlns:p14="http://schemas.microsoft.com/office/powerpoint/2010/main" val="2882630382"/>
       </p:ext>
     </p:extLst>
   </p:cSld>
@@ -1932,8 +1923,8 @@
         </p:nvSpPr>
         <p:spPr>
           <a:xfrm>
-            <a:off x="839788" y="457200"/>
-            <a:ext cx="3932237" cy="1600200"/>
+            <a:off x="932406" y="457200"/>
+            <a:ext cx="4365910" cy="1600200"/>
           </a:xfrm>
         </p:spPr>
         <p:txBody>
@@ -1948,7 +1939,7 @@
               <a:rPr lang="en-US" smtClean="0"/>
               <a:t>Click to edit Master title style</a:t>
             </a:r>
-            <a:endParaRPr lang="en-GB"/>
+            <a:endParaRPr lang="en-US" dirty="0"/>
           </a:p>
         </p:txBody>
       </p:sp>
@@ -1964,8 +1955,8 @@
         </p:nvSpPr>
         <p:spPr>
           <a:xfrm>
-            <a:off x="5183188" y="987425"/>
-            <a:ext cx="6172200" cy="4873625"/>
+            <a:off x="5754824" y="987426"/>
+            <a:ext cx="6852910" cy="4873625"/>
           </a:xfrm>
         </p:spPr>
         <p:txBody>
@@ -2033,7 +2024,7 @@
               <a:rPr lang="en-US" smtClean="0"/>
               <a:t>Fifth level</a:t>
             </a:r>
-            <a:endParaRPr lang="en-GB"/>
+            <a:endParaRPr lang="en-US" dirty="0"/>
           </a:p>
         </p:txBody>
       </p:sp>
@@ -2049,8 +2040,8 @@
         </p:nvSpPr>
         <p:spPr>
           <a:xfrm>
-            <a:off x="839788" y="2057400"/>
-            <a:ext cx="3932237" cy="3811588"/>
+            <a:off x="932406" y="2057400"/>
+            <a:ext cx="4365910" cy="3811588"/>
           </a:xfrm>
         </p:spPr>
         <p:txBody>
@@ -2119,7 +2110,7 @@
           <a:p>
             <a:fld id="{6CABAE2C-A9B2-44D4-9841-AA83B93BFA75}" type="datetimeFigureOut">
               <a:rPr lang="en-GB" smtClean="0"/>
-              <a:t>23/03/2017</a:t>
+              <a:t>24/03/2017</a:t>
             </a:fld>
             <a:endParaRPr lang="en-GB"/>
           </a:p>
@@ -2170,7 +2161,7 @@
     </p:spTree>
     <p:extLst>
       <p:ext uri="{BB962C8B-B14F-4D97-AF65-F5344CB8AC3E}">
-        <p14:creationId xmlns:p14="http://schemas.microsoft.com/office/powerpoint/2010/main" val="266369354"/>
+        <p14:creationId xmlns:p14="http://schemas.microsoft.com/office/powerpoint/2010/main" val="2138163163"/>
       </p:ext>
     </p:extLst>
   </p:cSld>
@@ -2209,8 +2200,8 @@
         </p:nvSpPr>
         <p:spPr>
           <a:xfrm>
-            <a:off x="839788" y="457200"/>
-            <a:ext cx="3932237" cy="1600200"/>
+            <a:off x="932406" y="457200"/>
+            <a:ext cx="4365910" cy="1600200"/>
           </a:xfrm>
         </p:spPr>
         <p:txBody>
@@ -2225,7 +2216,7 @@
               <a:rPr lang="en-US" smtClean="0"/>
               <a:t>Click to edit Master title style</a:t>
             </a:r>
-            <a:endParaRPr lang="en-GB"/>
+            <a:endParaRPr lang="en-US" dirty="0"/>
           </a:p>
         </p:txBody>
       </p:sp>
@@ -2233,7 +2224,7 @@
         <p:nvSpPr>
           <p:cNvPr id="3" name="Picture Placeholder 2"/>
           <p:cNvSpPr>
-            <a:spLocks noGrp="1"/>
+            <a:spLocks noGrp="1" noChangeAspect="1"/>
           </p:cNvSpPr>
           <p:nvPr>
             <p:ph type="pic" idx="1"/>
@@ -2241,12 +2232,12 @@
         </p:nvSpPr>
         <p:spPr>
           <a:xfrm>
-            <a:off x="5183188" y="987425"/>
-            <a:ext cx="6172200" cy="4873625"/>
-          </a:xfrm>
-        </p:spPr>
-        <p:txBody>
-          <a:bodyPr/>
+            <a:off x="5754824" y="987426"/>
+            <a:ext cx="6852910" cy="4873625"/>
+          </a:xfrm>
+        </p:spPr>
+        <p:txBody>
+          <a:bodyPr anchor="t"/>
           <a:lstStyle>
             <a:lvl1pPr marL="0" indent="0">
               <a:buNone/>
@@ -2286,7 +2277,11 @@
             </a:lvl9pPr>
           </a:lstStyle>
           <a:p>
-            <a:endParaRPr lang="en-GB"/>
+            <a:r>
+              <a:rPr lang="en-US" smtClean="0"/>
+              <a:t>Click icon to add picture</a:t>
+            </a:r>
+            <a:endParaRPr lang="en-US" dirty="0"/>
           </a:p>
         </p:txBody>
       </p:sp>
@@ -2302,8 +2297,8 @@
         </p:nvSpPr>
         <p:spPr>
           <a:xfrm>
-            <a:off x="839788" y="2057400"/>
-            <a:ext cx="3932237" cy="3811588"/>
+            <a:off x="932406" y="2057400"/>
+            <a:ext cx="4365910" cy="3811588"/>
           </a:xfrm>
         </p:spPr>
         <p:txBody>
@@ -2372,7 +2367,7 @@
           <a:p>
             <a:fld id="{6CABAE2C-A9B2-44D4-9841-AA83B93BFA75}" type="datetimeFigureOut">
               <a:rPr lang="en-GB" smtClean="0"/>
-              <a:t>23/03/2017</a:t>
+              <a:t>24/03/2017</a:t>
             </a:fld>
             <a:endParaRPr lang="en-GB"/>
           </a:p>
@@ -2423,7 +2418,7 @@
     </p:spTree>
     <p:extLst>
       <p:ext uri="{BB962C8B-B14F-4D97-AF65-F5344CB8AC3E}">
-        <p14:creationId xmlns:p14="http://schemas.microsoft.com/office/powerpoint/2010/main" val="2587775833"/>
+        <p14:creationId xmlns:p14="http://schemas.microsoft.com/office/powerpoint/2010/main" val="1140019999"/>
       </p:ext>
     </p:extLst>
   </p:cSld>
@@ -2467,8 +2462,8 @@
         </p:nvSpPr>
         <p:spPr>
           <a:xfrm>
-            <a:off x="838200" y="365125"/>
-            <a:ext cx="10515600" cy="1325563"/>
+            <a:off x="930642" y="365126"/>
+            <a:ext cx="11675329" cy="1325563"/>
           </a:xfrm>
           <a:prstGeom prst="rect">
             <a:avLst/>
@@ -2484,7 +2479,7 @@
               <a:rPr lang="en-US" smtClean="0"/>
               <a:t>Click to edit Master title style</a:t>
             </a:r>
-            <a:endParaRPr lang="en-GB"/>
+            <a:endParaRPr lang="en-US" dirty="0"/>
           </a:p>
         </p:txBody>
       </p:sp>
@@ -2500,8 +2495,8 @@
         </p:nvSpPr>
         <p:spPr>
           <a:xfrm>
-            <a:off x="838200" y="1825625"/>
-            <a:ext cx="10515600" cy="4351338"/>
+            <a:off x="930642" y="1825625"/>
+            <a:ext cx="11675329" cy="4351338"/>
           </a:xfrm>
           <a:prstGeom prst="rect">
             <a:avLst/>
@@ -2546,7 +2541,7 @@
               <a:rPr lang="en-US" smtClean="0"/>
               <a:t>Fifth level</a:t>
             </a:r>
-            <a:endParaRPr lang="en-GB"/>
+            <a:endParaRPr lang="en-US" dirty="0"/>
           </a:p>
         </p:txBody>
       </p:sp>
@@ -2562,8 +2557,8 @@
         </p:nvSpPr>
         <p:spPr>
           <a:xfrm>
-            <a:off x="838200" y="6356350"/>
-            <a:ext cx="2743200" cy="365125"/>
+            <a:off x="930642" y="6356351"/>
+            <a:ext cx="3045738" cy="365125"/>
           </a:xfrm>
           <a:prstGeom prst="rect">
             <a:avLst/>
@@ -2585,7 +2580,7 @@
           <a:p>
             <a:fld id="{6CABAE2C-A9B2-44D4-9841-AA83B93BFA75}" type="datetimeFigureOut">
               <a:rPr lang="en-GB" smtClean="0"/>
-              <a:t>23/03/2017</a:t>
+              <a:t>24/03/2017</a:t>
             </a:fld>
             <a:endParaRPr lang="en-GB"/>
           </a:p>
@@ -2603,8 +2598,8 @@
         </p:nvSpPr>
         <p:spPr>
           <a:xfrm>
-            <a:off x="4038600" y="6356350"/>
-            <a:ext cx="4114800" cy="365125"/>
+            <a:off x="4484003" y="6356351"/>
+            <a:ext cx="4568607" cy="365125"/>
           </a:xfrm>
           <a:prstGeom prst="rect">
             <a:avLst/>
@@ -2640,8 +2635,8 @@
         </p:nvSpPr>
         <p:spPr>
           <a:xfrm>
-            <a:off x="8610600" y="6356350"/>
-            <a:ext cx="2743200" cy="365125"/>
+            <a:off x="9560233" y="6356351"/>
+            <a:ext cx="3045738" cy="365125"/>
           </a:xfrm>
           <a:prstGeom prst="rect">
             <a:avLst/>
@@ -2672,23 +2667,23 @@
     </p:spTree>
     <p:extLst>
       <p:ext uri="{BB962C8B-B14F-4D97-AF65-F5344CB8AC3E}">
-        <p14:creationId xmlns:p14="http://schemas.microsoft.com/office/powerpoint/2010/main" val="1633725795"/>
+        <p14:creationId xmlns:p14="http://schemas.microsoft.com/office/powerpoint/2010/main" val="3444776126"/>
       </p:ext>
     </p:extLst>
   </p:cSld>
   <p:clrMap bg1="lt1" tx1="dk1" bg2="lt2" tx2="dk2" accent1="accent1" accent2="accent2" accent3="accent3" accent4="accent4" accent5="accent5" accent6="accent6" hlink="hlink" folHlink="folHlink"/>
   <p:sldLayoutIdLst>
-    <p:sldLayoutId id="2147483649" r:id="rId1"/>
-    <p:sldLayoutId id="2147483650" r:id="rId2"/>
-    <p:sldLayoutId id="2147483651" r:id="rId3"/>
-    <p:sldLayoutId id="2147483652" r:id="rId4"/>
-    <p:sldLayoutId id="2147483653" r:id="rId5"/>
-    <p:sldLayoutId id="2147483654" r:id="rId6"/>
-    <p:sldLayoutId id="2147483655" r:id="rId7"/>
-    <p:sldLayoutId id="2147483656" r:id="rId8"/>
-    <p:sldLayoutId id="2147483657" r:id="rId9"/>
-    <p:sldLayoutId id="2147483658" r:id="rId10"/>
-    <p:sldLayoutId id="2147483659" r:id="rId11"/>
+    <p:sldLayoutId id="2147483661" r:id="rId1"/>
+    <p:sldLayoutId id="2147483662" r:id="rId2"/>
+    <p:sldLayoutId id="2147483663" r:id="rId3"/>
+    <p:sldLayoutId id="2147483664" r:id="rId4"/>
+    <p:sldLayoutId id="2147483665" r:id="rId5"/>
+    <p:sldLayoutId id="2147483666" r:id="rId6"/>
+    <p:sldLayoutId id="2147483667" r:id="rId7"/>
+    <p:sldLayoutId id="2147483668" r:id="rId8"/>
+    <p:sldLayoutId id="2147483669" r:id="rId9"/>
+    <p:sldLayoutId id="2147483670" r:id="rId10"/>
+    <p:sldLayoutId id="2147483671" r:id="rId11"/>
   </p:sldLayoutIdLst>
   <p:txStyles>
     <p:titleStyle>
@@ -2990,6 +2985,81 @@
           <a:chExt cx="0" cy="0"/>
         </a:xfrm>
       </p:grpSpPr>
+      <p:pic>
+        <p:nvPicPr>
+          <p:cNvPr id="49" name="Picture 48"/>
+          <p:cNvPicPr>
+            <a:picLocks noChangeAspect="1"/>
+          </p:cNvPicPr>
+          <p:nvPr/>
+        </p:nvPicPr>
+        <p:blipFill>
+          <a:blip r:embed="rId2">
+            <a:extLst>
+              <a:ext uri="{28A0092B-C50C-407E-A947-70E740481C1C}">
+                <a14:useLocalDpi xmlns:a14="http://schemas.microsoft.com/office/drawing/2010/main" val="0"/>
+              </a:ext>
+            </a:extLst>
+          </a:blip>
+          <a:stretch>
+            <a:fillRect/>
+          </a:stretch>
+        </p:blipFill>
+        <p:spPr>
+          <a:xfrm>
+            <a:off x="1707129" y="894089"/>
+            <a:ext cx="1521332" cy="1732384"/>
+          </a:xfrm>
+          <a:prstGeom prst="rect">
+            <a:avLst/>
+          </a:prstGeom>
+        </p:spPr>
+      </p:pic>
+      <p:pic>
+        <p:nvPicPr>
+          <p:cNvPr id="41" name="Picture 40"/>
+          <p:cNvPicPr>
+            <a:picLocks noChangeAspect="1"/>
+          </p:cNvPicPr>
+          <p:nvPr/>
+        </p:nvPicPr>
+        <p:blipFill>
+          <a:blip r:embed="rId3">
+            <a:extLst>
+              <a:ext uri="{BEBA8EAE-BF5A-486C-A8C5-ECC9F3942E4B}">
+                <a14:imgProps xmlns:a14="http://schemas.microsoft.com/office/drawing/2010/main">
+                  <a14:imgLayer r:embed="rId4">
+                    <a14:imgEffect>
+                      <a14:backgroundRemoval t="10000" b="90000" l="10000" r="90000">
+                        <a14:foregroundMark x1="55219" y1="34979" x2="55219" y2="34979"/>
+                        <a14:foregroundMark x1="56902" y1="35802" x2="56902" y2="35802"/>
+                        <a14:foregroundMark x1="51515" y1="35391" x2="51515" y2="35391"/>
+                        <a14:foregroundMark x1="51852" y1="41152" x2="51852" y2="41152"/>
+                        <a14:foregroundMark x1="46128" y1="47325" x2="46128" y2="47325"/>
+                      </a14:backgroundRemoval>
+                    </a14:imgEffect>
+                  </a14:imgLayer>
+                </a14:imgProps>
+              </a:ext>
+              <a:ext uri="{28A0092B-C50C-407E-A947-70E740481C1C}">
+                <a14:useLocalDpi xmlns:a14="http://schemas.microsoft.com/office/drawing/2010/main" val="0"/>
+              </a:ext>
+            </a:extLst>
+          </a:blip>
+          <a:stretch>
+            <a:fillRect/>
+          </a:stretch>
+        </p:blipFill>
+        <p:spPr>
+          <a:xfrm>
+            <a:off x="9970756" y="2488175"/>
+            <a:ext cx="2583417" cy="2113705"/>
+          </a:xfrm>
+          <a:prstGeom prst="rect">
+            <a:avLst/>
+          </a:prstGeom>
+        </p:spPr>
+      </p:pic>
       <p:sp>
         <p:nvSpPr>
           <p:cNvPr id="11" name="Rounded Rectangle 10"/>
@@ -2998,15 +3068,17 @@
         </p:nvSpPr>
         <p:spPr>
           <a:xfrm>
-            <a:off x="2519160" y="846736"/>
-            <a:ext cx="5750378" cy="4302822"/>
+            <a:off x="3527910" y="28728"/>
+            <a:ext cx="6630541" cy="6631200"/>
           </a:xfrm>
           <a:prstGeom prst="roundRect">
             <a:avLst/>
           </a:prstGeom>
           <a:solidFill>
-            <a:schemeClr val="accent1">
-              <a:alpha val="51000"/>
+            <a:schemeClr val="accent2">
+              <a:lumMod val="60000"/>
+              <a:lumOff val="40000"/>
+              <a:alpha val="60000"/>
             </a:schemeClr>
           </a:solidFill>
         </p:spPr>
@@ -3031,10 +3103,135 @@
           <a:lstStyle/>
           <a:p>
             <a:pPr algn="ctr"/>
-            <a:endParaRPr lang="en-GB" dirty="0"/>
-          </a:p>
-        </p:txBody>
-      </p:sp>
+            <a:endParaRPr lang="en-GB" sz="1999" dirty="0"/>
+          </a:p>
+        </p:txBody>
+      </p:sp>
+      <p:pic>
+        <p:nvPicPr>
+          <p:cNvPr id="47" name="Picture 46"/>
+          <p:cNvPicPr>
+            <a:picLocks noChangeAspect="1"/>
+          </p:cNvPicPr>
+          <p:nvPr/>
+        </p:nvPicPr>
+        <p:blipFill>
+          <a:blip r:embed="rId5">
+            <a:extLst>
+              <a:ext uri="{BEBA8EAE-BF5A-486C-A8C5-ECC9F3942E4B}">
+                <a14:imgProps xmlns:a14="http://schemas.microsoft.com/office/drawing/2010/main">
+                  <a14:imgLayer r:embed="rId6">
+                    <a14:imgEffect>
+                      <a14:backgroundRemoval t="10000" b="90000" l="10000" r="90000"/>
+                    </a14:imgEffect>
+                  </a14:imgLayer>
+                </a14:imgProps>
+              </a:ext>
+              <a:ext uri="{28A0092B-C50C-407E-A947-70E740481C1C}">
+                <a14:useLocalDpi xmlns:a14="http://schemas.microsoft.com/office/drawing/2010/main" val="0"/>
+              </a:ext>
+            </a:extLst>
+          </a:blip>
+          <a:stretch>
+            <a:fillRect/>
+          </a:stretch>
+        </p:blipFill>
+        <p:spPr>
+          <a:xfrm>
+            <a:off x="4721378" y="2624957"/>
+            <a:ext cx="2628534" cy="2150619"/>
+          </a:xfrm>
+          <a:prstGeom prst="rect">
+            <a:avLst/>
+          </a:prstGeom>
+        </p:spPr>
+      </p:pic>
+      <p:pic>
+        <p:nvPicPr>
+          <p:cNvPr id="46" name="Picture 45"/>
+          <p:cNvPicPr>
+            <a:picLocks noChangeAspect="1"/>
+          </p:cNvPicPr>
+          <p:nvPr/>
+        </p:nvPicPr>
+        <p:blipFill>
+          <a:blip r:embed="rId7">
+            <a:extLst>
+              <a:ext uri="{BEBA8EAE-BF5A-486C-A8C5-ECC9F3942E4B}">
+                <a14:imgProps xmlns:a14="http://schemas.microsoft.com/office/drawing/2010/main">
+                  <a14:imgLayer r:embed="rId8">
+                    <a14:imgEffect>
+                      <a14:backgroundRemoval t="10000" b="90000" l="10000" r="90000">
+                        <a14:foregroundMark x1="52189" y1="42798" x2="52189" y2="42798"/>
+                        <a14:foregroundMark x1="51515" y1="38272" x2="51515" y2="38272"/>
+                        <a14:foregroundMark x1="47811" y1="44033" x2="47811" y2="44033"/>
+                        <a14:foregroundMark x1="43771" y1="35802" x2="43771" y2="35802"/>
+                        <a14:foregroundMark x1="40404" y1="47325" x2="40404" y2="47325"/>
+                        <a14:foregroundMark x1="56902" y1="39918" x2="56902" y2="39918"/>
+                        <a14:foregroundMark x1="39057" y1="34156" x2="39057" y2="34156"/>
+                      </a14:backgroundRemoval>
+                    </a14:imgEffect>
+                  </a14:imgLayer>
+                </a14:imgProps>
+              </a:ext>
+              <a:ext uri="{28A0092B-C50C-407E-A947-70E740481C1C}">
+                <a14:useLocalDpi xmlns:a14="http://schemas.microsoft.com/office/drawing/2010/main" val="0"/>
+              </a:ext>
+            </a:extLst>
+          </a:blip>
+          <a:stretch>
+            <a:fillRect/>
+          </a:stretch>
+        </p:blipFill>
+        <p:spPr>
+          <a:xfrm>
+            <a:off x="3104500" y="2583611"/>
+            <a:ext cx="2729600" cy="2233309"/>
+          </a:xfrm>
+          <a:prstGeom prst="rect">
+            <a:avLst/>
+          </a:prstGeom>
+        </p:spPr>
+      </p:pic>
+      <p:pic>
+        <p:nvPicPr>
+          <p:cNvPr id="43" name="Picture 42"/>
+          <p:cNvPicPr>
+            <a:picLocks noChangeAspect="1"/>
+          </p:cNvPicPr>
+          <p:nvPr/>
+        </p:nvPicPr>
+        <p:blipFill>
+          <a:blip r:embed="rId9">
+            <a:extLst>
+              <a:ext uri="{BEBA8EAE-BF5A-486C-A8C5-ECC9F3942E4B}">
+                <a14:imgProps xmlns:a14="http://schemas.microsoft.com/office/drawing/2010/main">
+                  <a14:imgLayer r:embed="rId10">
+                    <a14:imgEffect>
+                      <a14:backgroundRemoval t="10000" b="90000" l="10000" r="90000"/>
+                    </a14:imgEffect>
+                  </a14:imgLayer>
+                </a14:imgProps>
+              </a:ext>
+              <a:ext uri="{28A0092B-C50C-407E-A947-70E740481C1C}">
+                <a14:useLocalDpi xmlns:a14="http://schemas.microsoft.com/office/drawing/2010/main" val="0"/>
+              </a:ext>
+            </a:extLst>
+          </a:blip>
+          <a:stretch>
+            <a:fillRect/>
+          </a:stretch>
+        </p:blipFill>
+        <p:spPr>
+          <a:xfrm>
+            <a:off x="6222185" y="652276"/>
+            <a:ext cx="2713606" cy="2220222"/>
+          </a:xfrm>
+          <a:prstGeom prst="rect">
+            <a:avLst/>
+          </a:prstGeom>
+        </p:spPr>
+      </p:pic>
       <p:sp>
         <p:nvSpPr>
           <p:cNvPr id="4" name="TextBox 3"/>
@@ -3043,8 +3240,8 @@
         </p:nvSpPr>
         <p:spPr>
           <a:xfrm>
-            <a:off x="1155469" y="1903615"/>
-            <a:ext cx="827471" cy="369332"/>
+            <a:off x="1094901" y="524022"/>
+            <a:ext cx="1184940" cy="523220"/>
           </a:xfrm>
           <a:prstGeom prst="rect">
             <a:avLst/>
@@ -3058,10 +3255,10 @@
           <a:lstStyle/>
           <a:p>
             <a:r>
-              <a:rPr lang="en-GB" dirty="0" smtClean="0"/>
+              <a:rPr lang="en-GB" sz="2800" dirty="0"/>
               <a:t>Import</a:t>
             </a:r>
-            <a:endParaRPr lang="en-GB" dirty="0"/>
+            <a:endParaRPr lang="en-GB" sz="2800" dirty="0"/>
           </a:p>
         </p:txBody>
       </p:sp>
@@ -3073,8 +3270,8 @@
         </p:nvSpPr>
         <p:spPr>
           <a:xfrm>
-            <a:off x="1281304" y="3300153"/>
-            <a:ext cx="575799" cy="369332"/>
+            <a:off x="1291267" y="4115303"/>
+            <a:ext cx="792205" cy="523220"/>
           </a:xfrm>
           <a:prstGeom prst="rect">
             <a:avLst/>
@@ -3088,10 +3285,10 @@
           <a:lstStyle/>
           <a:p>
             <a:r>
-              <a:rPr lang="en-GB" dirty="0" smtClean="0"/>
+              <a:rPr lang="en-GB" sz="2800" dirty="0"/>
               <a:t>Tidy</a:t>
             </a:r>
-            <a:endParaRPr lang="en-GB" dirty="0"/>
+            <a:endParaRPr lang="en-GB" sz="2800" dirty="0"/>
           </a:p>
         </p:txBody>
       </p:sp>
@@ -3103,8 +3300,8 @@
         </p:nvSpPr>
         <p:spPr>
           <a:xfrm>
-            <a:off x="3273498" y="3300153"/>
-            <a:ext cx="1130053" cy="369332"/>
+            <a:off x="4451407" y="2380520"/>
+            <a:ext cx="1655774" cy="523220"/>
           </a:xfrm>
           <a:prstGeom prst="rect">
             <a:avLst/>
@@ -3118,7 +3315,7 @@
           <a:lstStyle/>
           <a:p>
             <a:r>
-              <a:rPr lang="en-GB" dirty="0" smtClean="0"/>
+              <a:rPr lang="en-GB" sz="2800" dirty="0"/>
               <a:t>Transform</a:t>
             </a:r>
           </a:p>
@@ -3132,8 +3329,8 @@
         </p:nvSpPr>
         <p:spPr>
           <a:xfrm>
-            <a:off x="5935285" y="2272947"/>
-            <a:ext cx="1002197" cy="369332"/>
+            <a:off x="7625094" y="526128"/>
+            <a:ext cx="1454244" cy="523220"/>
           </a:xfrm>
           <a:prstGeom prst="rect">
             <a:avLst/>
@@ -3147,10 +3344,10 @@
           <a:lstStyle/>
           <a:p>
             <a:r>
-              <a:rPr lang="en-GB" dirty="0" smtClean="0"/>
+              <a:rPr lang="en-GB" sz="2800" dirty="0"/>
               <a:t>Visualise</a:t>
             </a:r>
-            <a:endParaRPr lang="en-GB" dirty="0"/>
+            <a:endParaRPr lang="en-GB" sz="2800" dirty="0"/>
           </a:p>
         </p:txBody>
       </p:sp>
@@ -3162,8 +3359,8 @@
         </p:nvSpPr>
         <p:spPr>
           <a:xfrm>
-            <a:off x="6039478" y="4327359"/>
-            <a:ext cx="793807" cy="369332"/>
+            <a:off x="7786997" y="4091576"/>
+            <a:ext cx="1130438" cy="523220"/>
           </a:xfrm>
           <a:prstGeom prst="rect">
             <a:avLst/>
@@ -3177,10 +3374,10 @@
           <a:lstStyle/>
           <a:p>
             <a:r>
-              <a:rPr lang="en-GB" dirty="0" smtClean="0"/>
+              <a:rPr lang="en-GB" sz="2800" dirty="0"/>
               <a:t>Model</a:t>
             </a:r>
-            <a:endParaRPr lang="en-GB" dirty="0"/>
+            <a:endParaRPr lang="en-GB" sz="2800" dirty="0"/>
           </a:p>
         </p:txBody>
       </p:sp>
@@ -3192,8 +3389,8 @@
         </p:nvSpPr>
         <p:spPr>
           <a:xfrm>
-            <a:off x="8488923" y="3298588"/>
-            <a:ext cx="1489382" cy="369332"/>
+            <a:off x="10845264" y="2219745"/>
+            <a:ext cx="2210349" cy="523220"/>
           </a:xfrm>
           <a:prstGeom prst="rect">
             <a:avLst/>
@@ -3207,228 +3404,12 @@
           <a:lstStyle/>
           <a:p>
             <a:r>
-              <a:rPr lang="en-GB" dirty="0" smtClean="0"/>
+              <a:rPr lang="en-GB" sz="2800" dirty="0"/>
               <a:t>Communicate</a:t>
             </a:r>
           </a:p>
         </p:txBody>
       </p:sp>
-      <p:cxnSp>
-        <p:nvCxnSpPr>
-          <p:cNvPr id="13" name="Curved Connector 12"/>
-          <p:cNvCxnSpPr>
-            <a:stCxn id="4" idx="2"/>
-            <a:endCxn id="5" idx="0"/>
-          </p:cNvCxnSpPr>
-          <p:nvPr/>
-        </p:nvCxnSpPr>
-        <p:spPr>
-          <a:xfrm rot="5400000">
-            <a:off x="1055602" y="2786550"/>
-            <a:ext cx="1027206" cy="1"/>
-          </a:xfrm>
-          <a:prstGeom prst="curvedConnector3">
-            <a:avLst/>
-          </a:prstGeom>
-          <a:ln>
-            <a:tailEnd type="triangle"/>
-          </a:ln>
-        </p:spPr>
-        <p:style>
-          <a:lnRef idx="1">
-            <a:schemeClr val="accent1"/>
-          </a:lnRef>
-          <a:fillRef idx="0">
-            <a:schemeClr val="accent1"/>
-          </a:fillRef>
-          <a:effectRef idx="0">
-            <a:schemeClr val="accent1"/>
-          </a:effectRef>
-          <a:fontRef idx="minor">
-            <a:schemeClr val="tx1"/>
-          </a:fontRef>
-        </p:style>
-      </p:cxnSp>
-      <p:cxnSp>
-        <p:nvCxnSpPr>
-          <p:cNvPr id="17" name="Curved Connector 16"/>
-          <p:cNvCxnSpPr>
-            <a:stCxn id="5" idx="3"/>
-            <a:endCxn id="6" idx="1"/>
-          </p:cNvCxnSpPr>
-          <p:nvPr/>
-        </p:nvCxnSpPr>
-        <p:spPr>
-          <a:xfrm>
-            <a:off x="1857103" y="3484819"/>
-            <a:ext cx="1416395" cy="12700"/>
-          </a:xfrm>
-          <a:prstGeom prst="curvedConnector3">
-            <a:avLst/>
-          </a:prstGeom>
-          <a:ln>
-            <a:tailEnd type="triangle"/>
-          </a:ln>
-        </p:spPr>
-        <p:style>
-          <a:lnRef idx="1">
-            <a:schemeClr val="accent1"/>
-          </a:lnRef>
-          <a:fillRef idx="0">
-            <a:schemeClr val="accent1"/>
-          </a:fillRef>
-          <a:effectRef idx="0">
-            <a:schemeClr val="accent1"/>
-          </a:effectRef>
-          <a:fontRef idx="minor">
-            <a:schemeClr val="tx1"/>
-          </a:fontRef>
-        </p:style>
-      </p:cxnSp>
-      <p:cxnSp>
-        <p:nvCxnSpPr>
-          <p:cNvPr id="30" name="Straight Arrow Connector 29"/>
-          <p:cNvCxnSpPr>
-            <a:stCxn id="7" idx="2"/>
-            <a:endCxn id="8" idx="0"/>
-          </p:cNvCxnSpPr>
-          <p:nvPr/>
-        </p:nvCxnSpPr>
-        <p:spPr>
-          <a:xfrm flipH="1">
-            <a:off x="6436382" y="2642279"/>
-            <a:ext cx="2" cy="1685080"/>
-          </a:xfrm>
-          <a:prstGeom prst="straightConnector1">
-            <a:avLst/>
-          </a:prstGeom>
-          <a:ln>
-            <a:tailEnd type="triangle"/>
-          </a:ln>
-        </p:spPr>
-        <p:style>
-          <a:lnRef idx="1">
-            <a:schemeClr val="accent1"/>
-          </a:lnRef>
-          <a:fillRef idx="0">
-            <a:schemeClr val="accent1"/>
-          </a:fillRef>
-          <a:effectRef idx="0">
-            <a:schemeClr val="accent1"/>
-          </a:effectRef>
-          <a:fontRef idx="minor">
-            <a:schemeClr val="tx1"/>
-          </a:fontRef>
-        </p:style>
-      </p:cxnSp>
-      <p:cxnSp>
-        <p:nvCxnSpPr>
-          <p:cNvPr id="33" name="Straight Arrow Connector 32"/>
-          <p:cNvCxnSpPr>
-            <a:stCxn id="8" idx="1"/>
-            <a:endCxn id="6" idx="2"/>
-          </p:cNvCxnSpPr>
-          <p:nvPr/>
-        </p:nvCxnSpPr>
-        <p:spPr>
-          <a:xfrm flipH="1" flipV="1">
-            <a:off x="3838525" y="3669485"/>
-            <a:ext cx="2200953" cy="842540"/>
-          </a:xfrm>
-          <a:prstGeom prst="straightConnector1">
-            <a:avLst/>
-          </a:prstGeom>
-          <a:ln>
-            <a:tailEnd type="triangle"/>
-          </a:ln>
-        </p:spPr>
-        <p:style>
-          <a:lnRef idx="1">
-            <a:schemeClr val="accent1"/>
-          </a:lnRef>
-          <a:fillRef idx="0">
-            <a:schemeClr val="accent1"/>
-          </a:fillRef>
-          <a:effectRef idx="0">
-            <a:schemeClr val="accent1"/>
-          </a:effectRef>
-          <a:fontRef idx="minor">
-            <a:schemeClr val="tx1"/>
-          </a:fontRef>
-        </p:style>
-      </p:cxnSp>
-      <p:cxnSp>
-        <p:nvCxnSpPr>
-          <p:cNvPr id="35" name="Straight Arrow Connector 34"/>
-          <p:cNvCxnSpPr>
-            <a:stCxn id="6" idx="0"/>
-            <a:endCxn id="7" idx="1"/>
-          </p:cNvCxnSpPr>
-          <p:nvPr/>
-        </p:nvCxnSpPr>
-        <p:spPr>
-          <a:xfrm flipV="1">
-            <a:off x="3838525" y="2457613"/>
-            <a:ext cx="2096760" cy="842540"/>
-          </a:xfrm>
-          <a:prstGeom prst="straightConnector1">
-            <a:avLst/>
-          </a:prstGeom>
-          <a:ln>
-            <a:tailEnd type="triangle"/>
-          </a:ln>
-        </p:spPr>
-        <p:style>
-          <a:lnRef idx="1">
-            <a:schemeClr val="accent1"/>
-          </a:lnRef>
-          <a:fillRef idx="0">
-            <a:schemeClr val="accent1"/>
-          </a:fillRef>
-          <a:effectRef idx="0">
-            <a:schemeClr val="accent1"/>
-          </a:effectRef>
-          <a:fontRef idx="minor">
-            <a:schemeClr val="tx1"/>
-          </a:fontRef>
-        </p:style>
-      </p:cxnSp>
-      <p:cxnSp>
-        <p:nvCxnSpPr>
-          <p:cNvPr id="39" name="Straight Arrow Connector 38"/>
-          <p:cNvCxnSpPr>
-            <a:stCxn id="11" idx="3"/>
-            <a:endCxn id="10" idx="1"/>
-          </p:cNvCxnSpPr>
-          <p:nvPr/>
-        </p:nvCxnSpPr>
-        <p:spPr>
-          <a:xfrm>
-            <a:off x="8269538" y="2998147"/>
-            <a:ext cx="219385" cy="485107"/>
-          </a:xfrm>
-          <a:prstGeom prst="straightConnector1">
-            <a:avLst/>
-          </a:prstGeom>
-          <a:ln>
-            <a:tailEnd type="triangle"/>
-          </a:ln>
-        </p:spPr>
-        <p:style>
-          <a:lnRef idx="1">
-            <a:schemeClr val="accent1"/>
-          </a:lnRef>
-          <a:fillRef idx="0">
-            <a:schemeClr val="accent1"/>
-          </a:fillRef>
-          <a:effectRef idx="0">
-            <a:schemeClr val="accent1"/>
-          </a:effectRef>
-          <a:fontRef idx="minor">
-            <a:schemeClr val="tx1"/>
-          </a:fontRef>
-        </p:style>
-      </p:cxnSp>
       <p:pic>
         <p:nvPicPr>
           <p:cNvPr id="45" name="Picture 44"/>
@@ -3438,11 +3419,11 @@
           <p:nvPr/>
         </p:nvPicPr>
         <p:blipFill>
-          <a:blip r:embed="rId2">
+          <a:blip r:embed="rId11">
             <a:extLst>
               <a:ext uri="{BEBA8EAE-BF5A-486C-A8C5-ECC9F3942E4B}">
                 <a14:imgProps xmlns:a14="http://schemas.microsoft.com/office/drawing/2010/main">
-                  <a14:imgLayer r:embed="rId3">
+                  <a14:imgLayer r:embed="rId12">
                     <a14:imgEffect>
                       <a14:backgroundRemoval t="10000" b="90000" l="10000" r="90000">
                         <a14:foregroundMark x1="50842" y1="41152" x2="50842" y2="41152"/>
@@ -3478,8 +3459,8 @@
         </p:blipFill>
         <p:spPr>
           <a:xfrm>
-            <a:off x="5297363" y="3371146"/>
-            <a:ext cx="2337409" cy="1912425"/>
+            <a:off x="7054619" y="4390107"/>
+            <a:ext cx="2595194" cy="2123340"/>
           </a:xfrm>
           <a:prstGeom prst="rect">
             <a:avLst/>
@@ -3488,63 +3469,18 @@
       </p:pic>
       <p:pic>
         <p:nvPicPr>
-          <p:cNvPr id="41" name="Picture 40"/>
+          <p:cNvPr id="42" name="Picture 41"/>
           <p:cNvPicPr>
             <a:picLocks noChangeAspect="1"/>
           </p:cNvPicPr>
           <p:nvPr/>
         </p:nvPicPr>
         <p:blipFill>
-          <a:blip r:embed="rId4">
+          <a:blip r:embed="rId13">
             <a:extLst>
               <a:ext uri="{BEBA8EAE-BF5A-486C-A8C5-ECC9F3942E4B}">
                 <a14:imgProps xmlns:a14="http://schemas.microsoft.com/office/drawing/2010/main">
-                  <a14:imgLayer r:embed="rId5">
-                    <a14:imgEffect>
-                      <a14:backgroundRemoval t="10000" b="90000" l="10000" r="90000">
-                        <a14:foregroundMark x1="55219" y1="34979" x2="55219" y2="34979"/>
-                        <a14:foregroundMark x1="56902" y1="35802" x2="56902" y2="35802"/>
-                        <a14:foregroundMark x1="51515" y1="35391" x2="51515" y2="35391"/>
-                        <a14:foregroundMark x1="51852" y1="41152" x2="51852" y2="41152"/>
-                        <a14:foregroundMark x1="46128" y1="47325" x2="46128" y2="47325"/>
-                      </a14:backgroundRemoval>
-                    </a14:imgEffect>
-                  </a14:imgLayer>
-                </a14:imgProps>
-              </a:ext>
-              <a:ext uri="{28A0092B-C50C-407E-A947-70E740481C1C}">
-                <a14:useLocalDpi xmlns:a14="http://schemas.microsoft.com/office/drawing/2010/main" val="0"/>
-              </a:ext>
-            </a:extLst>
-          </a:blip>
-          <a:stretch>
-            <a:fillRect/>
-          </a:stretch>
-        </p:blipFill>
-        <p:spPr>
-          <a:xfrm>
-            <a:off x="7870889" y="3483254"/>
-            <a:ext cx="2326802" cy="1903747"/>
-          </a:xfrm>
-          <a:prstGeom prst="rect">
-            <a:avLst/>
-          </a:prstGeom>
-        </p:spPr>
-      </p:pic>
-      <p:pic>
-        <p:nvPicPr>
-          <p:cNvPr id="47" name="Picture 46"/>
-          <p:cNvPicPr>
-            <a:picLocks noChangeAspect="1"/>
-          </p:cNvPicPr>
-          <p:nvPr/>
-        </p:nvPicPr>
-        <p:blipFill>
-          <a:blip r:embed="rId6">
-            <a:extLst>
-              <a:ext uri="{BEBA8EAE-BF5A-486C-A8C5-ECC9F3942E4B}">
-                <a14:imgProps xmlns:a14="http://schemas.microsoft.com/office/drawing/2010/main">
-                  <a14:imgLayer r:embed="rId7">
+                  <a14:imgLayer r:embed="rId14">
                     <a14:imgEffect>
                       <a14:backgroundRemoval t="10000" b="90000" l="10000" r="90000"/>
                     </a14:imgEffect>
@@ -3562,86 +3498,8 @@
         </p:blipFill>
         <p:spPr>
           <a:xfrm>
-            <a:off x="2923306" y="3016278"/>
-            <a:ext cx="2367438" cy="1936995"/>
-          </a:xfrm>
-          <a:prstGeom prst="rect">
-            <a:avLst/>
-          </a:prstGeom>
-        </p:spPr>
-      </p:pic>
-      <p:pic>
-        <p:nvPicPr>
-          <p:cNvPr id="42" name="Picture 41"/>
-          <p:cNvPicPr>
-            <a:picLocks noChangeAspect="1"/>
-          </p:cNvPicPr>
-          <p:nvPr/>
-        </p:nvPicPr>
-        <p:blipFill>
-          <a:blip r:embed="rId8">
-            <a:extLst>
-              <a:ext uri="{BEBA8EAE-BF5A-486C-A8C5-ECC9F3942E4B}">
-                <a14:imgProps xmlns:a14="http://schemas.microsoft.com/office/drawing/2010/main">
-                  <a14:imgLayer r:embed="rId9">
-                    <a14:imgEffect>
-                      <a14:backgroundRemoval t="10000" b="90000" l="10000" r="90000"/>
-                    </a14:imgEffect>
-                  </a14:imgLayer>
-                </a14:imgProps>
-              </a:ext>
-              <a:ext uri="{28A0092B-C50C-407E-A947-70E740481C1C}">
-                <a14:useLocalDpi xmlns:a14="http://schemas.microsoft.com/office/drawing/2010/main" val="0"/>
-              </a:ext>
-            </a:extLst>
-          </a:blip>
-          <a:stretch>
-            <a:fillRect/>
-          </a:stretch>
-        </p:blipFill>
-        <p:spPr>
-          <a:xfrm>
-            <a:off x="9233614" y="3470970"/>
-            <a:ext cx="2341816" cy="1916031"/>
-          </a:xfrm>
-          <a:prstGeom prst="rect">
-            <a:avLst/>
-          </a:prstGeom>
-        </p:spPr>
-      </p:pic>
-      <p:pic>
-        <p:nvPicPr>
-          <p:cNvPr id="43" name="Picture 42"/>
-          <p:cNvPicPr>
-            <a:picLocks noChangeAspect="1"/>
-          </p:cNvPicPr>
-          <p:nvPr/>
-        </p:nvPicPr>
-        <p:blipFill>
-          <a:blip r:embed="rId10">
-            <a:extLst>
-              <a:ext uri="{BEBA8EAE-BF5A-486C-A8C5-ECC9F3942E4B}">
-                <a14:imgProps xmlns:a14="http://schemas.microsoft.com/office/drawing/2010/main">
-                  <a14:imgLayer r:embed="rId11">
-                    <a14:imgEffect>
-                      <a14:backgroundRemoval t="10000" b="90000" l="10000" r="90000"/>
-                    </a14:imgEffect>
-                  </a14:imgLayer>
-                </a14:imgProps>
-              </a:ext>
-              <a:ext uri="{28A0092B-C50C-407E-A947-70E740481C1C}">
-                <a14:useLocalDpi xmlns:a14="http://schemas.microsoft.com/office/drawing/2010/main" val="0"/>
-              </a:ext>
-            </a:extLst>
-          </a:blip>
-          <a:stretch>
-            <a:fillRect/>
-          </a:stretch>
-        </p:blipFill>
-        <p:spPr>
-          <a:xfrm>
-            <a:off x="4817448" y="846736"/>
-            <a:ext cx="2444059" cy="1999684"/>
+            <a:off x="11449719" y="2481357"/>
+            <a:ext cx="2600087" cy="2127343"/>
           </a:xfrm>
           <a:prstGeom prst="rect">
             <a:avLst/>
@@ -3657,11 +3515,11 @@
           <p:nvPr/>
         </p:nvPicPr>
         <p:blipFill>
-          <a:blip r:embed="rId12" cstate="print">
+          <a:blip r:embed="rId15" cstate="print">
             <a:extLst>
               <a:ext uri="{BEBA8EAE-BF5A-486C-A8C5-ECC9F3942E4B}">
                 <a14:imgProps xmlns:a14="http://schemas.microsoft.com/office/drawing/2010/main">
-                  <a14:imgLayer r:embed="rId13">
+                  <a14:imgLayer r:embed="rId16">
                     <a14:imgEffect>
                       <a14:backgroundRemoval t="6235" b="95683" l="8161" r="90285">
                         <a14:foregroundMark x1="35492" y1="12830" x2="35492" y2="12830"/>
@@ -3698,55 +3556,8 @@
         </p:blipFill>
         <p:spPr>
           <a:xfrm>
-            <a:off x="6645773" y="968388"/>
-            <a:ext cx="1585611" cy="1712953"/>
-          </a:xfrm>
-          <a:prstGeom prst="rect">
-            <a:avLst/>
-          </a:prstGeom>
-        </p:spPr>
-      </p:pic>
-      <p:pic>
-        <p:nvPicPr>
-          <p:cNvPr id="46" name="Picture 45"/>
-          <p:cNvPicPr>
-            <a:picLocks noChangeAspect="1"/>
-          </p:cNvPicPr>
-          <p:nvPr/>
-        </p:nvPicPr>
-        <p:blipFill>
-          <a:blip r:embed="rId14">
-            <a:extLst>
-              <a:ext uri="{BEBA8EAE-BF5A-486C-A8C5-ECC9F3942E4B}">
-                <a14:imgProps xmlns:a14="http://schemas.microsoft.com/office/drawing/2010/main">
-                  <a14:imgLayer r:embed="rId15">
-                    <a14:imgEffect>
-                      <a14:backgroundRemoval t="10000" b="90000" l="10000" r="90000">
-                        <a14:foregroundMark x1="52189" y1="42798" x2="52189" y2="42798"/>
-                        <a14:foregroundMark x1="51515" y1="38272" x2="51515" y2="38272"/>
-                        <a14:foregroundMark x1="47811" y1="44033" x2="47811" y2="44033"/>
-                        <a14:foregroundMark x1="43771" y1="35802" x2="43771" y2="35802"/>
-                        <a14:foregroundMark x1="40404" y1="47325" x2="40404" y2="47325"/>
-                        <a14:foregroundMark x1="56902" y1="39918" x2="56902" y2="39918"/>
-                        <a14:foregroundMark x1="39057" y1="34156" x2="39057" y2="34156"/>
-                      </a14:backgroundRemoval>
-                    </a14:imgEffect>
-                  </a14:imgLayer>
-                </a14:imgProps>
-              </a:ext>
-              <a:ext uri="{28A0092B-C50C-407E-A947-70E740481C1C}">
-                <a14:useLocalDpi xmlns:a14="http://schemas.microsoft.com/office/drawing/2010/main" val="0"/>
-              </a:ext>
-            </a:extLst>
-          </a:blip>
-          <a:stretch>
-            <a:fillRect/>
-          </a:stretch>
-        </p:blipFill>
-        <p:spPr>
-          <a:xfrm>
-            <a:off x="2177154" y="1802065"/>
-            <a:ext cx="2458465" cy="2011471"/>
+            <a:off x="8255732" y="781070"/>
+            <a:ext cx="1760482" cy="1901869"/>
           </a:xfrm>
           <a:prstGeom prst="rect">
             <a:avLst/>
@@ -3756,36 +3567,6 @@
       <p:pic>
         <p:nvPicPr>
           <p:cNvPr id="48" name="Picture 47"/>
-          <p:cNvPicPr>
-            <a:picLocks noChangeAspect="1"/>
-          </p:cNvPicPr>
-          <p:nvPr/>
-        </p:nvPicPr>
-        <p:blipFill>
-          <a:blip r:embed="rId16">
-            <a:extLst>
-              <a:ext uri="{28A0092B-C50C-407E-A947-70E740481C1C}">
-                <a14:useLocalDpi xmlns:a14="http://schemas.microsoft.com/office/drawing/2010/main" val="0"/>
-              </a:ext>
-            </a:extLst>
-          </a:blip>
-          <a:stretch>
-            <a:fillRect/>
-          </a:stretch>
-        </p:blipFill>
-        <p:spPr>
-          <a:xfrm>
-            <a:off x="940327" y="3966313"/>
-            <a:ext cx="1474548" cy="1657868"/>
-          </a:xfrm>
-          <a:prstGeom prst="rect">
-            <a:avLst/>
-          </a:prstGeom>
-        </p:spPr>
-      </p:pic>
-      <p:pic>
-        <p:nvPicPr>
-          <p:cNvPr id="49" name="Picture 48"/>
           <p:cNvPicPr>
             <a:picLocks noChangeAspect="1"/>
           </p:cNvPicPr>
@@ -3805,8 +3586,8 @@
         </p:blipFill>
         <p:spPr>
           <a:xfrm>
-            <a:off x="270719" y="2841654"/>
-            <a:ext cx="1370216" cy="1560304"/>
+            <a:off x="868785" y="4531423"/>
+            <a:ext cx="1637171" cy="1840708"/>
           </a:xfrm>
           <a:prstGeom prst="rect">
             <a:avLst/>
@@ -3835,14 +3616,383 @@
         </p:blipFill>
         <p:spPr>
           <a:xfrm>
-            <a:off x="687905" y="628385"/>
-            <a:ext cx="1489249" cy="1674399"/>
+            <a:off x="108341" y="830749"/>
+            <a:ext cx="1653493" cy="1859063"/>
           </a:xfrm>
           <a:prstGeom prst="rect">
             <a:avLst/>
           </a:prstGeom>
         </p:spPr>
       </p:pic>
+      <p:sp>
+        <p:nvSpPr>
+          <p:cNvPr id="80" name="Up Arrow 79"/>
+          <p:cNvSpPr/>
+          <p:nvPr/>
+        </p:nvSpPr>
+        <p:spPr>
+          <a:xfrm rot="10800000">
+            <a:off x="1583313" y="2503122"/>
+            <a:ext cx="207980" cy="1538111"/>
+          </a:xfrm>
+          <a:prstGeom prst="upArrow">
+            <a:avLst>
+              <a:gd name="adj1" fmla="val 50000"/>
+              <a:gd name="adj2" fmla="val 72371"/>
+            </a:avLst>
+          </a:prstGeom>
+          <a:solidFill>
+            <a:srgbClr val="3A7E3C"/>
+          </a:solidFill>
+          <a:ln>
+            <a:solidFill>
+              <a:srgbClr val="3A7E3C"/>
+            </a:solidFill>
+          </a:ln>
+        </p:spPr>
+        <p:style>
+          <a:lnRef idx="2">
+            <a:schemeClr val="accent1">
+              <a:shade val="50000"/>
+            </a:schemeClr>
+          </a:lnRef>
+          <a:fillRef idx="1">
+            <a:schemeClr val="accent1"/>
+          </a:fillRef>
+          <a:effectRef idx="0">
+            <a:schemeClr val="accent1"/>
+          </a:effectRef>
+          <a:fontRef idx="minor">
+            <a:schemeClr val="lt1"/>
+          </a:fontRef>
+        </p:style>
+        <p:txBody>
+          <a:bodyPr rtlCol="0" anchor="ctr"/>
+          <a:lstStyle/>
+          <a:p>
+            <a:pPr algn="ctr"/>
+            <a:endParaRPr lang="en-GB"/>
+          </a:p>
+        </p:txBody>
+      </p:sp>
+      <p:sp>
+        <p:nvSpPr>
+          <p:cNvPr id="82" name="Up Arrow 81"/>
+          <p:cNvSpPr/>
+          <p:nvPr/>
+        </p:nvSpPr>
+        <p:spPr>
+          <a:xfrm rot="24900000">
+            <a:off x="3189352" y="4252918"/>
+            <a:ext cx="208800" cy="1512000"/>
+          </a:xfrm>
+          <a:prstGeom prst="upArrow">
+            <a:avLst>
+              <a:gd name="adj1" fmla="val 50000"/>
+              <a:gd name="adj2" fmla="val 72371"/>
+            </a:avLst>
+          </a:prstGeom>
+          <a:solidFill>
+            <a:srgbClr val="3A7E3C"/>
+          </a:solidFill>
+          <a:ln>
+            <a:solidFill>
+              <a:srgbClr val="3A7E3C"/>
+            </a:solidFill>
+          </a:ln>
+        </p:spPr>
+        <p:style>
+          <a:lnRef idx="2">
+            <a:schemeClr val="accent1">
+              <a:shade val="50000"/>
+            </a:schemeClr>
+          </a:lnRef>
+          <a:fillRef idx="1">
+            <a:schemeClr val="accent1"/>
+          </a:fillRef>
+          <a:effectRef idx="0">
+            <a:schemeClr val="accent1"/>
+          </a:effectRef>
+          <a:fontRef idx="minor">
+            <a:schemeClr val="lt1"/>
+          </a:fontRef>
+        </p:style>
+        <p:txBody>
+          <a:bodyPr rtlCol="0" anchor="ctr"/>
+          <a:lstStyle/>
+          <a:p>
+            <a:pPr algn="ctr"/>
+            <a:endParaRPr lang="en-GB"/>
+          </a:p>
+        </p:txBody>
+      </p:sp>
+      <p:sp>
+        <p:nvSpPr>
+          <p:cNvPr id="83" name="Up Arrow 82"/>
+          <p:cNvSpPr/>
+          <p:nvPr/>
+        </p:nvSpPr>
+        <p:spPr>
+          <a:xfrm rot="10800000">
+            <a:off x="8241706" y="2506668"/>
+            <a:ext cx="208800" cy="1538111"/>
+          </a:xfrm>
+          <a:prstGeom prst="upArrow">
+            <a:avLst>
+              <a:gd name="adj1" fmla="val 50000"/>
+              <a:gd name="adj2" fmla="val 72371"/>
+            </a:avLst>
+          </a:prstGeom>
+          <a:solidFill>
+            <a:srgbClr val="3A7E3C"/>
+          </a:solidFill>
+          <a:ln>
+            <a:solidFill>
+              <a:srgbClr val="3A7E3C"/>
+            </a:solidFill>
+          </a:ln>
+        </p:spPr>
+        <p:style>
+          <a:lnRef idx="2">
+            <a:schemeClr val="accent1">
+              <a:shade val="50000"/>
+            </a:schemeClr>
+          </a:lnRef>
+          <a:fillRef idx="1">
+            <a:schemeClr val="accent1"/>
+          </a:fillRef>
+          <a:effectRef idx="0">
+            <a:schemeClr val="accent1"/>
+          </a:effectRef>
+          <a:fontRef idx="minor">
+            <a:schemeClr val="lt1"/>
+          </a:fontRef>
+        </p:style>
+        <p:txBody>
+          <a:bodyPr rtlCol="0" anchor="ctr"/>
+          <a:lstStyle/>
+          <a:p>
+            <a:pPr algn="ctr"/>
+            <a:endParaRPr lang="en-GB"/>
+          </a:p>
+        </p:txBody>
+      </p:sp>
+      <p:sp>
+        <p:nvSpPr>
+          <p:cNvPr id="84" name="Up Arrow 83"/>
+          <p:cNvSpPr/>
+          <p:nvPr/>
+        </p:nvSpPr>
+        <p:spPr>
+          <a:xfrm rot="24900000">
+            <a:off x="5707424" y="1043489"/>
+            <a:ext cx="208800" cy="1538111"/>
+          </a:xfrm>
+          <a:prstGeom prst="upArrow">
+            <a:avLst>
+              <a:gd name="adj1" fmla="val 50000"/>
+              <a:gd name="adj2" fmla="val 72371"/>
+            </a:avLst>
+          </a:prstGeom>
+          <a:solidFill>
+            <a:srgbClr val="3A7E3C"/>
+          </a:solidFill>
+          <a:ln>
+            <a:solidFill>
+              <a:srgbClr val="3A7E3C"/>
+            </a:solidFill>
+          </a:ln>
+        </p:spPr>
+        <p:style>
+          <a:lnRef idx="2">
+            <a:schemeClr val="accent1">
+              <a:shade val="50000"/>
+            </a:schemeClr>
+          </a:lnRef>
+          <a:fillRef idx="1">
+            <a:schemeClr val="accent1"/>
+          </a:fillRef>
+          <a:effectRef idx="0">
+            <a:schemeClr val="accent1"/>
+          </a:effectRef>
+          <a:fontRef idx="minor">
+            <a:schemeClr val="lt1"/>
+          </a:fontRef>
+        </p:style>
+        <p:txBody>
+          <a:bodyPr rtlCol="0" anchor="ctr"/>
+          <a:lstStyle/>
+          <a:p>
+            <a:pPr algn="ctr"/>
+            <a:endParaRPr lang="en-GB"/>
+          </a:p>
+        </p:txBody>
+      </p:sp>
+      <p:sp>
+        <p:nvSpPr>
+          <p:cNvPr id="85" name="Up Arrow 84"/>
+          <p:cNvSpPr/>
+          <p:nvPr/>
+        </p:nvSpPr>
+        <p:spPr>
+          <a:xfrm rot="17760000">
+            <a:off x="6415735" y="4391878"/>
+            <a:ext cx="208800" cy="1553492"/>
+          </a:xfrm>
+          <a:prstGeom prst="upArrow">
+            <a:avLst>
+              <a:gd name="adj1" fmla="val 50000"/>
+              <a:gd name="adj2" fmla="val 72371"/>
+            </a:avLst>
+          </a:prstGeom>
+          <a:solidFill>
+            <a:srgbClr val="3A7E3C"/>
+          </a:solidFill>
+          <a:ln>
+            <a:solidFill>
+              <a:srgbClr val="3A7E3C"/>
+            </a:solidFill>
+          </a:ln>
+        </p:spPr>
+        <p:style>
+          <a:lnRef idx="2">
+            <a:schemeClr val="accent1">
+              <a:shade val="50000"/>
+            </a:schemeClr>
+          </a:lnRef>
+          <a:fillRef idx="1">
+            <a:schemeClr val="accent1"/>
+          </a:fillRef>
+          <a:effectRef idx="0">
+            <a:schemeClr val="accent1"/>
+          </a:effectRef>
+          <a:fontRef idx="minor">
+            <a:schemeClr val="lt1"/>
+          </a:fontRef>
+        </p:style>
+        <p:txBody>
+          <a:bodyPr rtlCol="0" anchor="ctr"/>
+          <a:lstStyle/>
+          <a:p>
+            <a:pPr algn="ctr"/>
+            <a:endParaRPr lang="en-GB"/>
+          </a:p>
+        </p:txBody>
+      </p:sp>
+      <p:sp>
+        <p:nvSpPr>
+          <p:cNvPr id="86" name="Up Arrow 85"/>
+          <p:cNvSpPr/>
+          <p:nvPr/>
+        </p:nvSpPr>
+        <p:spPr>
+          <a:xfrm rot="7800000">
+            <a:off x="10868262" y="-188033"/>
+            <a:ext cx="208800" cy="2376000"/>
+          </a:xfrm>
+          <a:prstGeom prst="upArrow">
+            <a:avLst>
+              <a:gd name="adj1" fmla="val 50000"/>
+              <a:gd name="adj2" fmla="val 72371"/>
+            </a:avLst>
+          </a:prstGeom>
+          <a:solidFill>
+            <a:schemeClr val="accent2">
+              <a:lumMod val="60000"/>
+              <a:lumOff val="40000"/>
+            </a:schemeClr>
+          </a:solidFill>
+          <a:ln>
+            <a:solidFill>
+              <a:schemeClr val="accent2">
+                <a:lumMod val="60000"/>
+                <a:lumOff val="40000"/>
+              </a:schemeClr>
+            </a:solidFill>
+          </a:ln>
+        </p:spPr>
+        <p:style>
+          <a:lnRef idx="2">
+            <a:schemeClr val="accent1">
+              <a:shade val="50000"/>
+            </a:schemeClr>
+          </a:lnRef>
+          <a:fillRef idx="1">
+            <a:schemeClr val="accent1"/>
+          </a:fillRef>
+          <a:effectRef idx="0">
+            <a:schemeClr val="accent1"/>
+          </a:effectRef>
+          <a:fontRef idx="minor">
+            <a:schemeClr val="lt1"/>
+          </a:fontRef>
+        </p:style>
+        <p:txBody>
+          <a:bodyPr rtlCol="0" anchor="ctr"/>
+          <a:lstStyle/>
+          <a:p>
+            <a:pPr algn="ctr"/>
+            <a:endParaRPr lang="en-GB"/>
+          </a:p>
+        </p:txBody>
+      </p:sp>
+      <p:sp>
+        <p:nvSpPr>
+          <p:cNvPr id="87" name="Up Arrow 86"/>
+          <p:cNvSpPr/>
+          <p:nvPr/>
+        </p:nvSpPr>
+        <p:spPr>
+          <a:xfrm rot="24000000">
+            <a:off x="10740864" y="4371177"/>
+            <a:ext cx="208800" cy="2376000"/>
+          </a:xfrm>
+          <a:prstGeom prst="upArrow">
+            <a:avLst>
+              <a:gd name="adj1" fmla="val 50000"/>
+              <a:gd name="adj2" fmla="val 72371"/>
+            </a:avLst>
+          </a:prstGeom>
+          <a:solidFill>
+            <a:schemeClr val="accent2">
+              <a:lumMod val="60000"/>
+              <a:lumOff val="40000"/>
+            </a:schemeClr>
+          </a:solidFill>
+          <a:ln>
+            <a:solidFill>
+              <a:schemeClr val="accent2">
+                <a:lumMod val="60000"/>
+                <a:lumOff val="40000"/>
+              </a:schemeClr>
+            </a:solidFill>
+          </a:ln>
+        </p:spPr>
+        <p:style>
+          <a:lnRef idx="2">
+            <a:schemeClr val="accent1">
+              <a:shade val="50000"/>
+            </a:schemeClr>
+          </a:lnRef>
+          <a:fillRef idx="1">
+            <a:schemeClr val="accent1"/>
+          </a:fillRef>
+          <a:effectRef idx="0">
+            <a:schemeClr val="accent1"/>
+          </a:effectRef>
+          <a:fontRef idx="minor">
+            <a:schemeClr val="lt1"/>
+          </a:fontRef>
+        </p:style>
+        <p:txBody>
+          <a:bodyPr rtlCol="0" anchor="ctr"/>
+          <a:lstStyle/>
+          <a:p>
+            <a:pPr algn="ctr"/>
+            <a:endParaRPr lang="en-GB"/>
+          </a:p>
+        </p:txBody>
+      </p:sp>
     </p:spTree>
     <p:extLst>
       <p:ext uri="{BB962C8B-B14F-4D97-AF65-F5344CB8AC3E}">
@@ -3853,13 +4003,20 @@
   <p:clrMapOvr>
     <a:masterClrMapping/>
   </p:clrMapOvr>
+  <p:timing>
+    <p:tnLst>
+      <p:par>
+        <p:cTn id="1" dur="indefinite" restart="never" nodeType="tmRoot"/>
+      </p:par>
+    </p:tnLst>
+  </p:timing>
 </p:sld>
 </file>
 
 <file path=ppt/theme/theme1.xml><?xml version="1.0" encoding="utf-8"?>
 <a:theme xmlns:a="http://schemas.openxmlformats.org/drawingml/2006/main" name="Office Theme">
   <a:themeElements>
-    <a:clrScheme name="Office">
+    <a:clrScheme name="Office Theme">
       <a:dk1>
         <a:sysClr val="windowText" lastClr="000000"/>
       </a:dk1>
@@ -3897,7 +4054,7 @@
         <a:srgbClr val="954F72"/>
       </a:folHlink>
     </a:clrScheme>
-    <a:fontScheme name="Office">
+    <a:fontScheme name="Office Theme">
       <a:majorFont>
         <a:latin typeface="Calibri Light" panose="020F0302020204030204"/>
         <a:ea typeface=""/>
@@ -3969,7 +4126,7 @@
         <a:font script="Geor" typeface="Sylfaen"/>
       </a:minorFont>
     </a:fontScheme>
-    <a:fmtScheme name="Office">
+    <a:fmtScheme name="Office Theme">
       <a:fillStyleLst>
         <a:solidFill>
           <a:schemeClr val="phClr"/>

</xml_diff>

<commit_message>
Moved broom to Transform
</commit_message>
<xml_diff>
--- a/workflow.pptx
+++ b/workflow.pptx
@@ -255,7 +255,7 @@
           <a:p>
             <a:fld id="{6CABAE2C-A9B2-44D4-9841-AA83B93BFA75}" type="datetimeFigureOut">
               <a:rPr lang="en-GB" smtClean="0"/>
-              <a:t>24/03/2017</a:t>
+              <a:t>27/03/2017</a:t>
             </a:fld>
             <a:endParaRPr lang="en-GB"/>
           </a:p>
@@ -425,7 +425,7 @@
           <a:p>
             <a:fld id="{6CABAE2C-A9B2-44D4-9841-AA83B93BFA75}" type="datetimeFigureOut">
               <a:rPr lang="en-GB" smtClean="0"/>
-              <a:t>24/03/2017</a:t>
+              <a:t>27/03/2017</a:t>
             </a:fld>
             <a:endParaRPr lang="en-GB"/>
           </a:p>
@@ -605,7 +605,7 @@
           <a:p>
             <a:fld id="{6CABAE2C-A9B2-44D4-9841-AA83B93BFA75}" type="datetimeFigureOut">
               <a:rPr lang="en-GB" smtClean="0"/>
-              <a:t>24/03/2017</a:t>
+              <a:t>27/03/2017</a:t>
             </a:fld>
             <a:endParaRPr lang="en-GB"/>
           </a:p>
@@ -775,7 +775,7 @@
           <a:p>
             <a:fld id="{6CABAE2C-A9B2-44D4-9841-AA83B93BFA75}" type="datetimeFigureOut">
               <a:rPr lang="en-GB" smtClean="0"/>
-              <a:t>24/03/2017</a:t>
+              <a:t>27/03/2017</a:t>
             </a:fld>
             <a:endParaRPr lang="en-GB"/>
           </a:p>
@@ -1021,7 +1021,7 @@
           <a:p>
             <a:fld id="{6CABAE2C-A9B2-44D4-9841-AA83B93BFA75}" type="datetimeFigureOut">
               <a:rPr lang="en-GB" smtClean="0"/>
-              <a:t>24/03/2017</a:t>
+              <a:t>27/03/2017</a:t>
             </a:fld>
             <a:endParaRPr lang="en-GB"/>
           </a:p>
@@ -1253,7 +1253,7 @@
           <a:p>
             <a:fld id="{6CABAE2C-A9B2-44D4-9841-AA83B93BFA75}" type="datetimeFigureOut">
               <a:rPr lang="en-GB" smtClean="0"/>
-              <a:t>24/03/2017</a:t>
+              <a:t>27/03/2017</a:t>
             </a:fld>
             <a:endParaRPr lang="en-GB"/>
           </a:p>
@@ -1620,7 +1620,7 @@
           <a:p>
             <a:fld id="{6CABAE2C-A9B2-44D4-9841-AA83B93BFA75}" type="datetimeFigureOut">
               <a:rPr lang="en-GB" smtClean="0"/>
-              <a:t>24/03/2017</a:t>
+              <a:t>27/03/2017</a:t>
             </a:fld>
             <a:endParaRPr lang="en-GB"/>
           </a:p>
@@ -1738,7 +1738,7 @@
           <a:p>
             <a:fld id="{6CABAE2C-A9B2-44D4-9841-AA83B93BFA75}" type="datetimeFigureOut">
               <a:rPr lang="en-GB" smtClean="0"/>
-              <a:t>24/03/2017</a:t>
+              <a:t>27/03/2017</a:t>
             </a:fld>
             <a:endParaRPr lang="en-GB"/>
           </a:p>
@@ -1833,7 +1833,7 @@
           <a:p>
             <a:fld id="{6CABAE2C-A9B2-44D4-9841-AA83B93BFA75}" type="datetimeFigureOut">
               <a:rPr lang="en-GB" smtClean="0"/>
-              <a:t>24/03/2017</a:t>
+              <a:t>27/03/2017</a:t>
             </a:fld>
             <a:endParaRPr lang="en-GB"/>
           </a:p>
@@ -2110,7 +2110,7 @@
           <a:p>
             <a:fld id="{6CABAE2C-A9B2-44D4-9841-AA83B93BFA75}" type="datetimeFigureOut">
               <a:rPr lang="en-GB" smtClean="0"/>
-              <a:t>24/03/2017</a:t>
+              <a:t>27/03/2017</a:t>
             </a:fld>
             <a:endParaRPr lang="en-GB"/>
           </a:p>
@@ -2367,7 +2367,7 @@
           <a:p>
             <a:fld id="{6CABAE2C-A9B2-44D4-9841-AA83B93BFA75}" type="datetimeFigureOut">
               <a:rPr lang="en-GB" smtClean="0"/>
-              <a:t>24/03/2017</a:t>
+              <a:t>27/03/2017</a:t>
             </a:fld>
             <a:endParaRPr lang="en-GB"/>
           </a:p>
@@ -2580,7 +2580,7 @@
           <a:p>
             <a:fld id="{6CABAE2C-A9B2-44D4-9841-AA83B93BFA75}" type="datetimeFigureOut">
               <a:rPr lang="en-GB" smtClean="0"/>
-              <a:t>24/03/2017</a:t>
+              <a:t>27/03/2017</a:t>
             </a:fld>
             <a:endParaRPr lang="en-GB"/>
           </a:p>
@@ -2985,6 +2985,53 @@
           <a:chExt cx="0" cy="0"/>
         </a:xfrm>
       </p:grpSpPr>
+      <p:sp>
+        <p:nvSpPr>
+          <p:cNvPr id="11" name="Rounded Rectangle 10"/>
+          <p:cNvSpPr/>
+          <p:nvPr/>
+        </p:nvSpPr>
+        <p:spPr>
+          <a:xfrm>
+            <a:off x="3527910" y="28728"/>
+            <a:ext cx="6630541" cy="6631200"/>
+          </a:xfrm>
+          <a:prstGeom prst="roundRect">
+            <a:avLst/>
+          </a:prstGeom>
+          <a:solidFill>
+            <a:schemeClr val="accent2">
+              <a:lumMod val="60000"/>
+              <a:lumOff val="40000"/>
+              <a:alpha val="60000"/>
+            </a:schemeClr>
+          </a:solidFill>
+        </p:spPr>
+        <p:style>
+          <a:lnRef idx="2">
+            <a:schemeClr val="accent1">
+              <a:shade val="50000"/>
+            </a:schemeClr>
+          </a:lnRef>
+          <a:fillRef idx="1">
+            <a:schemeClr val="accent1"/>
+          </a:fillRef>
+          <a:effectRef idx="0">
+            <a:schemeClr val="accent1"/>
+          </a:effectRef>
+          <a:fontRef idx="minor">
+            <a:schemeClr val="lt1"/>
+          </a:fontRef>
+        </p:style>
+        <p:txBody>
+          <a:bodyPr rtlCol="0" anchor="ctr"/>
+          <a:lstStyle/>
+          <a:p>
+            <a:pPr algn="ctr"/>
+            <a:endParaRPr lang="en-GB" sz="1999" dirty="0"/>
+          </a:p>
+        </p:txBody>
+      </p:sp>
       <p:pic>
         <p:nvPicPr>
           <p:cNvPr id="49" name="Picture 48"/>
@@ -3007,7 +3054,7 @@
         </p:blipFill>
         <p:spPr>
           <a:xfrm>
-            <a:off x="1707129" y="894089"/>
+            <a:off x="4498086" y="4115303"/>
             <a:ext cx="1521332" cy="1732384"/>
           </a:xfrm>
           <a:prstGeom prst="rect">
@@ -3060,53 +3107,6 @@
           </a:prstGeom>
         </p:spPr>
       </p:pic>
-      <p:sp>
-        <p:nvSpPr>
-          <p:cNvPr id="11" name="Rounded Rectangle 10"/>
-          <p:cNvSpPr/>
-          <p:nvPr/>
-        </p:nvSpPr>
-        <p:spPr>
-          <a:xfrm>
-            <a:off x="3527910" y="28728"/>
-            <a:ext cx="6630541" cy="6631200"/>
-          </a:xfrm>
-          <a:prstGeom prst="roundRect">
-            <a:avLst/>
-          </a:prstGeom>
-          <a:solidFill>
-            <a:schemeClr val="accent2">
-              <a:lumMod val="60000"/>
-              <a:lumOff val="40000"/>
-              <a:alpha val="60000"/>
-            </a:schemeClr>
-          </a:solidFill>
-        </p:spPr>
-        <p:style>
-          <a:lnRef idx="2">
-            <a:schemeClr val="accent1">
-              <a:shade val="50000"/>
-            </a:schemeClr>
-          </a:lnRef>
-          <a:fillRef idx="1">
-            <a:schemeClr val="accent1"/>
-          </a:fillRef>
-          <a:effectRef idx="0">
-            <a:schemeClr val="accent1"/>
-          </a:effectRef>
-          <a:fontRef idx="minor">
-            <a:schemeClr val="lt1"/>
-          </a:fontRef>
-        </p:style>
-        <p:txBody>
-          <a:bodyPr rtlCol="0" anchor="ctr"/>
-          <a:lstStyle/>
-          <a:p>
-            <a:pPr algn="ctr"/>
-            <a:endParaRPr lang="en-GB" sz="1999" dirty="0"/>
-          </a:p>
-        </p:txBody>
-      </p:sp>
       <p:pic>
         <p:nvPicPr>
           <p:cNvPr id="47" name="Picture 46"/>
@@ -3240,7 +3240,7 @@
         </p:nvSpPr>
         <p:spPr>
           <a:xfrm>
-            <a:off x="1094901" y="524022"/>
+            <a:off x="1094833" y="334636"/>
             <a:ext cx="1184940" cy="523220"/>
           </a:xfrm>
           <a:prstGeom prst="rect">
@@ -3258,7 +3258,6 @@
               <a:rPr lang="en-GB" sz="2800" dirty="0"/>
               <a:t>Import</a:t>
             </a:r>
-            <a:endParaRPr lang="en-GB" sz="2800" dirty="0"/>
           </a:p>
         </p:txBody>
       </p:sp>
@@ -3288,7 +3287,6 @@
               <a:rPr lang="en-GB" sz="2800" dirty="0"/>
               <a:t>Tidy</a:t>
             </a:r>
-            <a:endParaRPr lang="en-GB" sz="2800" dirty="0"/>
           </a:p>
         </p:txBody>
       </p:sp>
@@ -3347,7 +3345,6 @@
               <a:rPr lang="en-GB" sz="2800" dirty="0"/>
               <a:t>Visualise</a:t>
             </a:r>
-            <a:endParaRPr lang="en-GB" sz="2800" dirty="0"/>
           </a:p>
         </p:txBody>
       </p:sp>
@@ -3377,7 +3374,6 @@
               <a:rPr lang="en-GB" sz="2800" dirty="0"/>
               <a:t>Model</a:t>
             </a:r>
-            <a:endParaRPr lang="en-GB" sz="2800" dirty="0"/>
           </a:p>
         </p:txBody>
       </p:sp>
@@ -3616,7 +3612,7 @@
         </p:blipFill>
         <p:spPr>
           <a:xfrm>
-            <a:off x="108341" y="830749"/>
+            <a:off x="880224" y="787738"/>
             <a:ext cx="1653493" cy="1859063"/>
           </a:xfrm>
           <a:prstGeom prst="rect">
@@ -3632,7 +3628,7 @@
         </p:nvSpPr>
         <p:spPr>
           <a:xfrm rot="10800000">
-            <a:off x="1583313" y="2503122"/>
+            <a:off x="1583313" y="2681847"/>
             <a:ext cx="207980" cy="1538111"/>
           </a:xfrm>
           <a:prstGeom prst="upArrow">
@@ -3836,8 +3832,8 @@
         </p:nvSpPr>
         <p:spPr>
           <a:xfrm rot="17760000">
-            <a:off x="6415735" y="4391878"/>
-            <a:ext cx="208800" cy="1553492"/>
+            <a:off x="6734682" y="4246392"/>
+            <a:ext cx="208800" cy="1368000"/>
           </a:xfrm>
           <a:prstGeom prst="upArrow">
             <a:avLst>

</xml_diff>